<commit_message>
updated lec09-10 part II slides, updated syllabus
</commit_message>
<xml_diff>
--- a/LEC/lec09-10-stable-marriage-problem/Stable Marriage Slides, Part II.pptx
+++ b/LEC/lec09-10-stable-marriage-problem/Stable Marriage Slides, Part II.pptx
@@ -5,25 +5,26 @@
     <p:sldMasterId id="2147483648" r:id="rId1"/>
   </p:sldMasterIdLst>
   <p:notesMasterIdLst>
-    <p:notesMasterId r:id="rId18"/>
+    <p:notesMasterId r:id="rId19"/>
   </p:notesMasterIdLst>
   <p:sldIdLst>
     <p:sldId id="256" r:id="rId2"/>
     <p:sldId id="261" r:id="rId3"/>
     <p:sldId id="263" r:id="rId4"/>
     <p:sldId id="264" r:id="rId5"/>
-    <p:sldId id="266" r:id="rId6"/>
-    <p:sldId id="267" r:id="rId7"/>
-    <p:sldId id="268" r:id="rId8"/>
-    <p:sldId id="270" r:id="rId9"/>
-    <p:sldId id="269" r:id="rId10"/>
-    <p:sldId id="271" r:id="rId11"/>
-    <p:sldId id="272" r:id="rId12"/>
-    <p:sldId id="273" r:id="rId13"/>
-    <p:sldId id="274" r:id="rId14"/>
-    <p:sldId id="275" r:id="rId15"/>
-    <p:sldId id="260" r:id="rId16"/>
-    <p:sldId id="265" r:id="rId17"/>
+    <p:sldId id="276" r:id="rId6"/>
+    <p:sldId id="266" r:id="rId7"/>
+    <p:sldId id="267" r:id="rId8"/>
+    <p:sldId id="268" r:id="rId9"/>
+    <p:sldId id="270" r:id="rId10"/>
+    <p:sldId id="269" r:id="rId11"/>
+    <p:sldId id="271" r:id="rId12"/>
+    <p:sldId id="272" r:id="rId13"/>
+    <p:sldId id="273" r:id="rId14"/>
+    <p:sldId id="274" r:id="rId15"/>
+    <p:sldId id="275" r:id="rId16"/>
+    <p:sldId id="260" r:id="rId17"/>
+    <p:sldId id="265" r:id="rId18"/>
   </p:sldIdLst>
   <p:sldSz cx="12192000" cy="6858000"/>
   <p:notesSz cx="6858000" cy="9144000"/>
@@ -133,7 +134,7 @@
 <file path=ppt/revisionInfo.xml><?xml version="1.0" encoding="utf-8"?>
 <p1510:revInfo xmlns:a="http://schemas.openxmlformats.org/drawingml/2006/main" xmlns:r="http://schemas.openxmlformats.org/officeDocument/2006/relationships" xmlns:p1510="http://schemas.microsoft.com/office/powerpoint/2015/10/main">
   <p1510:revLst>
-    <p1510:client id="{0239818E-FECA-4149-A441-07619F1C3CDC}" v="436" dt="2025-02-19T14:23:08.012"/>
+    <p1510:client id="{1DF59089-C948-474B-98A1-31A82A2666DC}" v="95" dt="2026-02-11T13:30:17.891"/>
   </p1510:revLst>
 </p1510:revInfo>
 </file>
@@ -141,35 +142,20 @@
 <file path=ppt/changesInfos/changesInfo1.xml><?xml version="1.0" encoding="utf-8"?>
 <pc:chgInfo xmlns:a="http://schemas.openxmlformats.org/drawingml/2006/main" xmlns:r="http://schemas.openxmlformats.org/officeDocument/2006/relationships" xmlns:ac="http://schemas.microsoft.com/office/drawing/2013/main/command" xmlns:pc="http://schemas.microsoft.com/office/powerpoint/2013/main/command">
   <pc:docChgLst>
-    <pc:chgData name="Frommer, Ian Dr. (EDU)" userId="28ca3ff0-544f-450a-928b-99e19cf49b89" providerId="ADAL" clId="{0239818E-FECA-4149-A441-07619F1C3CDC}"/>
-    <pc:docChg chg="undo custSel addSld modSld sldOrd">
-      <pc:chgData name="Frommer, Ian Dr. (EDU)" userId="28ca3ff0-544f-450a-928b-99e19cf49b89" providerId="ADAL" clId="{0239818E-FECA-4149-A441-07619F1C3CDC}" dt="2025-02-19T15:08:57.931" v="4188" actId="20578"/>
+    <pc:chgData name="Frommer, Ian Dr. (EDU)" userId="28ca3ff0-544f-450a-928b-99e19cf49b89" providerId="ADAL" clId="{FDDA6EB0-4FD6-4516-ACA5-A4CAC6441DA7}"/>
+    <pc:docChg chg="undo custSel addSld delSld modSld">
+      <pc:chgData name="Frommer, Ian Dr. (EDU)" userId="28ca3ff0-544f-450a-928b-99e19cf49b89" providerId="ADAL" clId="{FDDA6EB0-4FD6-4516-ACA5-A4CAC6441DA7}" dt="2026-02-11T14:02:30.238" v="307" actId="6549"/>
       <pc:docMkLst>
         <pc:docMk/>
       </pc:docMkLst>
       <pc:sldChg chg="modSp mod">
-        <pc:chgData name="Frommer, Ian Dr. (EDU)" userId="28ca3ff0-544f-450a-928b-99e19cf49b89" providerId="ADAL" clId="{0239818E-FECA-4149-A441-07619F1C3CDC}" dt="2025-02-12T18:41:46.898" v="1" actId="20577"/>
-        <pc:sldMkLst>
-          <pc:docMk/>
-          <pc:sldMk cId="1074573397" sldId="256"/>
-        </pc:sldMkLst>
-        <pc:spChg chg="mod">
-          <ac:chgData name="Frommer, Ian Dr. (EDU)" userId="28ca3ff0-544f-450a-928b-99e19cf49b89" providerId="ADAL" clId="{0239818E-FECA-4149-A441-07619F1C3CDC}" dt="2025-02-12T18:41:46.898" v="1" actId="20577"/>
-          <ac:spMkLst>
-            <pc:docMk/>
-            <pc:sldMk cId="1074573397" sldId="256"/>
-            <ac:spMk id="3" creationId="{7739A02C-7149-20DC-277A-23BFEF5E6B89}"/>
-          </ac:spMkLst>
-        </pc:spChg>
-      </pc:sldChg>
-      <pc:sldChg chg="modSp add mod modNotesTx">
-        <pc:chgData name="Frommer, Ian Dr. (EDU)" userId="28ca3ff0-544f-450a-928b-99e19cf49b89" providerId="ADAL" clId="{0239818E-FECA-4149-A441-07619F1C3CDC}" dt="2025-02-19T14:57:47.386" v="3745" actId="20577"/>
+        <pc:chgData name="Frommer, Ian Dr. (EDU)" userId="28ca3ff0-544f-450a-928b-99e19cf49b89" providerId="ADAL" clId="{FDDA6EB0-4FD6-4516-ACA5-A4CAC6441DA7}" dt="2026-02-11T14:02:30.238" v="307" actId="6549"/>
         <pc:sldMkLst>
           <pc:docMk/>
           <pc:sldMk cId="1022732612" sldId="260"/>
         </pc:sldMkLst>
         <pc:spChg chg="mod">
-          <ac:chgData name="Frommer, Ian Dr. (EDU)" userId="28ca3ff0-544f-450a-928b-99e19cf49b89" providerId="ADAL" clId="{0239818E-FECA-4149-A441-07619F1C3CDC}" dt="2025-02-19T14:57:39.706" v="3741" actId="20577"/>
+          <ac:chgData name="Frommer, Ian Dr. (EDU)" userId="28ca3ff0-544f-450a-928b-99e19cf49b89" providerId="ADAL" clId="{FDDA6EB0-4FD6-4516-ACA5-A4CAC6441DA7}" dt="2026-02-11T14:02:30.238" v="307" actId="6549"/>
           <ac:spMkLst>
             <pc:docMk/>
             <pc:sldMk cId="1022732612" sldId="260"/>
@@ -177,367 +163,194 @@
           </ac:spMkLst>
         </pc:spChg>
       </pc:sldChg>
-      <pc:sldChg chg="modSp new mod">
-        <pc:chgData name="Frommer, Ian Dr. (EDU)" userId="28ca3ff0-544f-450a-928b-99e19cf49b89" providerId="ADAL" clId="{0239818E-FECA-4149-A441-07619F1C3CDC}" dt="2025-02-19T13:01:22.617" v="2048" actId="20577"/>
-        <pc:sldMkLst>
-          <pc:docMk/>
-          <pc:sldMk cId="3549982" sldId="261"/>
-        </pc:sldMkLst>
-        <pc:spChg chg="mod">
-          <ac:chgData name="Frommer, Ian Dr. (EDU)" userId="28ca3ff0-544f-450a-928b-99e19cf49b89" providerId="ADAL" clId="{0239818E-FECA-4149-A441-07619F1C3CDC}" dt="2025-02-18T14:25:37.633" v="169" actId="114"/>
-          <ac:spMkLst>
-            <pc:docMk/>
-            <pc:sldMk cId="3549982" sldId="261"/>
-            <ac:spMk id="2" creationId="{CD880828-BDBD-08EA-EAE8-6E39517F6882}"/>
-          </ac:spMkLst>
-        </pc:spChg>
-        <pc:spChg chg="mod">
-          <ac:chgData name="Frommer, Ian Dr. (EDU)" userId="28ca3ff0-544f-450a-928b-99e19cf49b89" providerId="ADAL" clId="{0239818E-FECA-4149-A441-07619F1C3CDC}" dt="2025-02-19T13:01:22.617" v="2048" actId="20577"/>
-          <ac:spMkLst>
-            <pc:docMk/>
-            <pc:sldMk cId="3549982" sldId="261"/>
-            <ac:spMk id="3" creationId="{5FA25B1E-FEE9-67A2-6406-A6EB2F130706}"/>
-          </ac:spMkLst>
-        </pc:spChg>
-      </pc:sldChg>
-      <pc:sldChg chg="modSp add mod ord modAnim">
-        <pc:chgData name="Frommer, Ian Dr. (EDU)" userId="28ca3ff0-544f-450a-928b-99e19cf49b89" providerId="ADAL" clId="{0239818E-FECA-4149-A441-07619F1C3CDC}" dt="2025-02-19T13:02:31.763" v="2072" actId="20577"/>
-        <pc:sldMkLst>
-          <pc:docMk/>
-          <pc:sldMk cId="410359151" sldId="263"/>
-        </pc:sldMkLst>
-        <pc:spChg chg="mod">
-          <ac:chgData name="Frommer, Ian Dr. (EDU)" userId="28ca3ff0-544f-450a-928b-99e19cf49b89" providerId="ADAL" clId="{0239818E-FECA-4149-A441-07619F1C3CDC}" dt="2025-02-19T13:02:31.763" v="2072" actId="20577"/>
-          <ac:spMkLst>
-            <pc:docMk/>
-            <pc:sldMk cId="410359151" sldId="263"/>
-            <ac:spMk id="3" creationId="{CCF877CB-DA0B-FDB4-E6F2-3F7F5E24037D}"/>
-          </ac:spMkLst>
-        </pc:spChg>
-      </pc:sldChg>
-      <pc:sldChg chg="add ord">
-        <pc:chgData name="Frommer, Ian Dr. (EDU)" userId="28ca3ff0-544f-450a-928b-99e19cf49b89" providerId="ADAL" clId="{0239818E-FECA-4149-A441-07619F1C3CDC}" dt="2025-02-19T15:08:57.931" v="4188" actId="20578"/>
+      <pc:sldChg chg="addSp delSp modSp mod addAnim delAnim modAnim">
+        <pc:chgData name="Frommer, Ian Dr. (EDU)" userId="28ca3ff0-544f-450a-928b-99e19cf49b89" providerId="ADAL" clId="{FDDA6EB0-4FD6-4516-ACA5-A4CAC6441DA7}" dt="2026-02-11T13:29:10.374" v="228"/>
         <pc:sldMkLst>
           <pc:docMk/>
           <pc:sldMk cId="2326768796" sldId="264"/>
         </pc:sldMkLst>
+        <pc:spChg chg="mod">
+          <ac:chgData name="Frommer, Ian Dr. (EDU)" userId="28ca3ff0-544f-450a-928b-99e19cf49b89" providerId="ADAL" clId="{FDDA6EB0-4FD6-4516-ACA5-A4CAC6441DA7}" dt="2026-02-11T13:28:39.159" v="227" actId="255"/>
+          <ac:spMkLst>
+            <pc:docMk/>
+            <pc:sldMk cId="2326768796" sldId="264"/>
+            <ac:spMk id="3" creationId="{81AD906E-0A14-6F6E-D81D-F2639A32F944}"/>
+          </ac:spMkLst>
+        </pc:spChg>
+        <pc:graphicFrameChg chg="del">
+          <ac:chgData name="Frommer, Ian Dr. (EDU)" userId="28ca3ff0-544f-450a-928b-99e19cf49b89" providerId="ADAL" clId="{FDDA6EB0-4FD6-4516-ACA5-A4CAC6441DA7}" dt="2026-02-11T13:22:09.841" v="4" actId="478"/>
+          <ac:graphicFrameMkLst>
+            <pc:docMk/>
+            <pc:sldMk cId="2326768796" sldId="264"/>
+            <ac:graphicFrameMk id="15" creationId="{DC8F6C51-A6E1-4E20-4A66-400BFCB19C81}"/>
+          </ac:graphicFrameMkLst>
+        </pc:graphicFrameChg>
+        <pc:picChg chg="del">
+          <ac:chgData name="Frommer, Ian Dr. (EDU)" userId="28ca3ff0-544f-450a-928b-99e19cf49b89" providerId="ADAL" clId="{FDDA6EB0-4FD6-4516-ACA5-A4CAC6441DA7}" dt="2026-02-11T13:22:23.713" v="9" actId="478"/>
+          <ac:picMkLst>
+            <pc:docMk/>
+            <pc:sldMk cId="2326768796" sldId="264"/>
+            <ac:picMk id="7" creationId="{74B2F2F7-DCFD-C212-7ABA-C7BCCE0F9C1A}"/>
+          </ac:picMkLst>
+        </pc:picChg>
+        <pc:picChg chg="del">
+          <ac:chgData name="Frommer, Ian Dr. (EDU)" userId="28ca3ff0-544f-450a-928b-99e19cf49b89" providerId="ADAL" clId="{FDDA6EB0-4FD6-4516-ACA5-A4CAC6441DA7}" dt="2026-02-11T13:22:22.990" v="8" actId="478"/>
+          <ac:picMkLst>
+            <pc:docMk/>
+            <pc:sldMk cId="2326768796" sldId="264"/>
+            <ac:picMk id="8" creationId="{A9799CC2-DEB5-B8EC-10ED-5140E61B7381}"/>
+          </ac:picMkLst>
+        </pc:picChg>
+        <pc:picChg chg="del">
+          <ac:chgData name="Frommer, Ian Dr. (EDU)" userId="28ca3ff0-544f-450a-928b-99e19cf49b89" providerId="ADAL" clId="{FDDA6EB0-4FD6-4516-ACA5-A4CAC6441DA7}" dt="2026-02-11T13:22:22.258" v="7" actId="478"/>
+          <ac:picMkLst>
+            <pc:docMk/>
+            <pc:sldMk cId="2326768796" sldId="264"/>
+            <ac:picMk id="9" creationId="{AA7EEEE5-B7F2-43EE-B597-AFD39A647AE2}"/>
+          </ac:picMkLst>
+        </pc:picChg>
+        <pc:picChg chg="del">
+          <ac:chgData name="Frommer, Ian Dr. (EDU)" userId="28ca3ff0-544f-450a-928b-99e19cf49b89" providerId="ADAL" clId="{FDDA6EB0-4FD6-4516-ACA5-A4CAC6441DA7}" dt="2026-02-11T13:22:25.599" v="11" actId="478"/>
+          <ac:picMkLst>
+            <pc:docMk/>
+            <pc:sldMk cId="2326768796" sldId="264"/>
+            <ac:picMk id="10" creationId="{D3CA439B-7171-6CA9-C6D9-4AA531B42645}"/>
+          </ac:picMkLst>
+        </pc:picChg>
+        <pc:picChg chg="del">
+          <ac:chgData name="Frommer, Ian Dr. (EDU)" userId="28ca3ff0-544f-450a-928b-99e19cf49b89" providerId="ADAL" clId="{FDDA6EB0-4FD6-4516-ACA5-A4CAC6441DA7}" dt="2026-02-11T13:22:21.168" v="6" actId="478"/>
+          <ac:picMkLst>
+            <pc:docMk/>
+            <pc:sldMk cId="2326768796" sldId="264"/>
+            <ac:picMk id="11" creationId="{42D8EB23-FB1E-4D6F-12AB-8D4C1656F900}"/>
+          </ac:picMkLst>
+        </pc:picChg>
+        <pc:picChg chg="add del mod">
+          <ac:chgData name="Frommer, Ian Dr. (EDU)" userId="28ca3ff0-544f-450a-928b-99e19cf49b89" providerId="ADAL" clId="{FDDA6EB0-4FD6-4516-ACA5-A4CAC6441DA7}" dt="2026-02-11T13:22:24.308" v="10" actId="478"/>
+          <ac:picMkLst>
+            <pc:docMk/>
+            <pc:sldMk cId="2326768796" sldId="264"/>
+            <ac:picMk id="13" creationId="{6AE29C02-15EA-2A1C-F794-EA321D9D7D2A}"/>
+          </ac:picMkLst>
+        </pc:picChg>
       </pc:sldChg>
-      <pc:sldChg chg="modSp add mod">
-        <pc:chgData name="Frommer, Ian Dr. (EDU)" userId="28ca3ff0-544f-450a-928b-99e19cf49b89" providerId="ADAL" clId="{0239818E-FECA-4149-A441-07619F1C3CDC}" dt="2025-02-19T15:06:51.957" v="4185" actId="27636"/>
+      <pc:sldChg chg="addSp delSp modSp add mod addAnim delAnim modAnim">
+        <pc:chgData name="Frommer, Ian Dr. (EDU)" userId="28ca3ff0-544f-450a-928b-99e19cf49b89" providerId="ADAL" clId="{FDDA6EB0-4FD6-4516-ACA5-A4CAC6441DA7}" dt="2026-02-11T13:29:52.200" v="229"/>
         <pc:sldMkLst>
           <pc:docMk/>
-          <pc:sldMk cId="596108354" sldId="265"/>
+          <pc:sldMk cId="231334887" sldId="276"/>
         </pc:sldMkLst>
         <pc:spChg chg="mod">
-          <ac:chgData name="Frommer, Ian Dr. (EDU)" userId="28ca3ff0-544f-450a-928b-99e19cf49b89" providerId="ADAL" clId="{0239818E-FECA-4149-A441-07619F1C3CDC}" dt="2025-02-13T13:40:00.903" v="52" actId="20577"/>
+          <ac:chgData name="Frommer, Ian Dr. (EDU)" userId="28ca3ff0-544f-450a-928b-99e19cf49b89" providerId="ADAL" clId="{FDDA6EB0-4FD6-4516-ACA5-A4CAC6441DA7}" dt="2026-02-11T13:27:45.079" v="215" actId="1076"/>
           <ac:spMkLst>
             <pc:docMk/>
-            <pc:sldMk cId="596108354" sldId="265"/>
-            <ac:spMk id="2" creationId="{C97C426C-565D-E66A-4017-1FCA05D5EBA1}"/>
+            <pc:sldMk cId="231334887" sldId="276"/>
+            <ac:spMk id="2" creationId="{90F6FB91-E499-365B-0EE7-EB63FA8DA419}"/>
           </ac:spMkLst>
         </pc:spChg>
         <pc:spChg chg="mod">
-          <ac:chgData name="Frommer, Ian Dr. (EDU)" userId="28ca3ff0-544f-450a-928b-99e19cf49b89" providerId="ADAL" clId="{0239818E-FECA-4149-A441-07619F1C3CDC}" dt="2025-02-19T15:06:51.957" v="4185" actId="27636"/>
+          <ac:chgData name="Frommer, Ian Dr. (EDU)" userId="28ca3ff0-544f-450a-928b-99e19cf49b89" providerId="ADAL" clId="{FDDA6EB0-4FD6-4516-ACA5-A4CAC6441DA7}" dt="2026-02-11T13:25:32.320" v="150" actId="6549"/>
           <ac:spMkLst>
             <pc:docMk/>
-            <pc:sldMk cId="596108354" sldId="265"/>
-            <ac:spMk id="3" creationId="{DE54666E-E53E-C9B2-C80D-4660A16C25A2}"/>
-          </ac:spMkLst>
-        </pc:spChg>
-      </pc:sldChg>
-      <pc:sldChg chg="addSp delSp modSp new mod modAnim modNotesTx">
-        <pc:chgData name="Frommer, Ian Dr. (EDU)" userId="28ca3ff0-544f-450a-928b-99e19cf49b89" providerId="ADAL" clId="{0239818E-FECA-4149-A441-07619F1C3CDC}" dt="2025-02-18T15:50:47.679" v="1362" actId="20577"/>
-        <pc:sldMkLst>
-          <pc:docMk/>
-          <pc:sldMk cId="3734494951" sldId="266"/>
-        </pc:sldMkLst>
-        <pc:spChg chg="mod">
-          <ac:chgData name="Frommer, Ian Dr. (EDU)" userId="28ca3ff0-544f-450a-928b-99e19cf49b89" providerId="ADAL" clId="{0239818E-FECA-4149-A441-07619F1C3CDC}" dt="2025-02-18T15:44:46.415" v="1185" actId="1036"/>
-          <ac:spMkLst>
-            <pc:docMk/>
-            <pc:sldMk cId="3734494951" sldId="266"/>
-            <ac:spMk id="2" creationId="{2DD3FB98-5D5C-3BC8-2B53-347F41FA6366}"/>
-          </ac:spMkLst>
-        </pc:spChg>
-        <pc:spChg chg="add del mod">
-          <ac:chgData name="Frommer, Ian Dr. (EDU)" userId="28ca3ff0-544f-450a-928b-99e19cf49b89" providerId="ADAL" clId="{0239818E-FECA-4149-A441-07619F1C3CDC}" dt="2025-02-18T15:45:23.662" v="1271" actId="14100"/>
-          <ac:spMkLst>
-            <pc:docMk/>
-            <pc:sldMk cId="3734494951" sldId="266"/>
-            <ac:spMk id="3" creationId="{B2A6D429-2A18-9356-E084-133C21D60F25}"/>
-          </ac:spMkLst>
-        </pc:spChg>
-        <pc:spChg chg="add mod">
-          <ac:chgData name="Frommer, Ian Dr. (EDU)" userId="28ca3ff0-544f-450a-928b-99e19cf49b89" providerId="ADAL" clId="{0239818E-FECA-4149-A441-07619F1C3CDC}" dt="2025-02-18T15:46:34.527" v="1308" actId="14100"/>
-          <ac:spMkLst>
-            <pc:docMk/>
-            <pc:sldMk cId="3734494951" sldId="266"/>
-            <ac:spMk id="6" creationId="{72BD8285-001A-8116-59FB-44041DBAC171}"/>
-          </ac:spMkLst>
-        </pc:spChg>
-        <pc:picChg chg="add mod">
-          <ac:chgData name="Frommer, Ian Dr. (EDU)" userId="28ca3ff0-544f-450a-928b-99e19cf49b89" providerId="ADAL" clId="{0239818E-FECA-4149-A441-07619F1C3CDC}" dt="2025-02-18T15:44:46.415" v="1185" actId="1036"/>
-          <ac:picMkLst>
-            <pc:docMk/>
-            <pc:sldMk cId="3734494951" sldId="266"/>
-            <ac:picMk id="5" creationId="{1C296BEE-0DEF-E228-BF80-6CB99F57384A}"/>
-          </ac:picMkLst>
-        </pc:picChg>
-      </pc:sldChg>
-      <pc:sldChg chg="addSp modSp new mod modAnim">
-        <pc:chgData name="Frommer, Ian Dr. (EDU)" userId="28ca3ff0-544f-450a-928b-99e19cf49b89" providerId="ADAL" clId="{0239818E-FECA-4149-A441-07619F1C3CDC}" dt="2025-02-19T13:41:17.043" v="2409" actId="27636"/>
-        <pc:sldMkLst>
-          <pc:docMk/>
-          <pc:sldMk cId="3760360756" sldId="267"/>
-        </pc:sldMkLst>
-        <pc:spChg chg="mod">
-          <ac:chgData name="Frommer, Ian Dr. (EDU)" userId="28ca3ff0-544f-450a-928b-99e19cf49b89" providerId="ADAL" clId="{0239818E-FECA-4149-A441-07619F1C3CDC}" dt="2025-02-13T13:43:04.123" v="96" actId="20577"/>
-          <ac:spMkLst>
-            <pc:docMk/>
-            <pc:sldMk cId="3760360756" sldId="267"/>
-            <ac:spMk id="2" creationId="{2B430F67-583F-BE69-11E4-96580126D66C}"/>
+            <pc:sldMk cId="231334887" sldId="276"/>
+            <ac:spMk id="3" creationId="{7C6F0586-B6E6-495A-6209-75280A0C99AC}"/>
           </ac:spMkLst>
         </pc:spChg>
         <pc:spChg chg="mod">
-          <ac:chgData name="Frommer, Ian Dr. (EDU)" userId="28ca3ff0-544f-450a-928b-99e19cf49b89" providerId="ADAL" clId="{0239818E-FECA-4149-A441-07619F1C3CDC}" dt="2025-02-19T13:41:17.043" v="2409" actId="27636"/>
+          <ac:chgData name="Frommer, Ian Dr. (EDU)" userId="28ca3ff0-544f-450a-928b-99e19cf49b89" providerId="ADAL" clId="{FDDA6EB0-4FD6-4516-ACA5-A4CAC6441DA7}" dt="2026-02-11T13:24:39.809" v="74" actId="1036"/>
           <ac:spMkLst>
             <pc:docMk/>
-            <pc:sldMk cId="3760360756" sldId="267"/>
-            <ac:spMk id="3" creationId="{83333A12-670E-366A-6C3F-E87588203483}"/>
-          </ac:spMkLst>
-        </pc:spChg>
-        <pc:picChg chg="add mod modCrop">
-          <ac:chgData name="Frommer, Ian Dr. (EDU)" userId="28ca3ff0-544f-450a-928b-99e19cf49b89" providerId="ADAL" clId="{0239818E-FECA-4149-A441-07619F1C3CDC}" dt="2025-02-18T16:42:24.416" v="1896" actId="1076"/>
-          <ac:picMkLst>
-            <pc:docMk/>
-            <pc:sldMk cId="3760360756" sldId="267"/>
-            <ac:picMk id="5" creationId="{F1028982-1A92-6AF9-CC76-A1A2B15C375A}"/>
-          </ac:picMkLst>
-        </pc:picChg>
-        <pc:picChg chg="add mod modCrop">
-          <ac:chgData name="Frommer, Ian Dr. (EDU)" userId="28ca3ff0-544f-450a-928b-99e19cf49b89" providerId="ADAL" clId="{0239818E-FECA-4149-A441-07619F1C3CDC}" dt="2025-02-18T16:42:19.369" v="1895" actId="1076"/>
-          <ac:picMkLst>
-            <pc:docMk/>
-            <pc:sldMk cId="3760360756" sldId="267"/>
-            <ac:picMk id="6" creationId="{21AD7B3A-A7E9-B330-0998-3DB7C87686FE}"/>
-          </ac:picMkLst>
-        </pc:picChg>
-      </pc:sldChg>
-      <pc:sldChg chg="modSp add mod">
-        <pc:chgData name="Frommer, Ian Dr. (EDU)" userId="28ca3ff0-544f-450a-928b-99e19cf49b89" providerId="ADAL" clId="{0239818E-FECA-4149-A441-07619F1C3CDC}" dt="2025-02-18T16:44:16.385" v="1928" actId="27636"/>
-        <pc:sldMkLst>
-          <pc:docMk/>
-          <pc:sldMk cId="300980877" sldId="268"/>
-        </pc:sldMkLst>
-        <pc:spChg chg="mod">
-          <ac:chgData name="Frommer, Ian Dr. (EDU)" userId="28ca3ff0-544f-450a-928b-99e19cf49b89" providerId="ADAL" clId="{0239818E-FECA-4149-A441-07619F1C3CDC}" dt="2025-02-18T16:43:56.567" v="1920" actId="20577"/>
-          <ac:spMkLst>
-            <pc:docMk/>
-            <pc:sldMk cId="300980877" sldId="268"/>
-            <ac:spMk id="2" creationId="{9C34B549-4FF8-952E-1DB8-37345869DCBF}"/>
+            <pc:sldMk cId="231334887" sldId="276"/>
+            <ac:spMk id="4" creationId="{886A36C7-ED20-0568-8F9A-95D497A55927}"/>
           </ac:spMkLst>
         </pc:spChg>
         <pc:spChg chg="mod">
-          <ac:chgData name="Frommer, Ian Dr. (EDU)" userId="28ca3ff0-544f-450a-928b-99e19cf49b89" providerId="ADAL" clId="{0239818E-FECA-4149-A441-07619F1C3CDC}" dt="2025-02-18T16:44:16.385" v="1928" actId="27636"/>
+          <ac:chgData name="Frommer, Ian Dr. (EDU)" userId="28ca3ff0-544f-450a-928b-99e19cf49b89" providerId="ADAL" clId="{FDDA6EB0-4FD6-4516-ACA5-A4CAC6441DA7}" dt="2026-02-11T13:24:39.809" v="74" actId="1036"/>
           <ac:spMkLst>
             <pc:docMk/>
-            <pc:sldMk cId="300980877" sldId="268"/>
-            <ac:spMk id="3" creationId="{9DF24574-C6C6-0B7C-E910-4CFD2E47CDC2}"/>
-          </ac:spMkLst>
-        </pc:spChg>
-      </pc:sldChg>
-      <pc:sldChg chg="addSp modSp new mod">
-        <pc:chgData name="Frommer, Ian Dr. (EDU)" userId="28ca3ff0-544f-450a-928b-99e19cf49b89" providerId="ADAL" clId="{0239818E-FECA-4149-A441-07619F1C3CDC}" dt="2025-02-19T13:54:15.023" v="2567" actId="1076"/>
-        <pc:sldMkLst>
-          <pc:docMk/>
-          <pc:sldMk cId="3836707026" sldId="269"/>
-        </pc:sldMkLst>
-        <pc:spChg chg="mod">
-          <ac:chgData name="Frommer, Ian Dr. (EDU)" userId="28ca3ff0-544f-450a-928b-99e19cf49b89" providerId="ADAL" clId="{0239818E-FECA-4149-A441-07619F1C3CDC}" dt="2025-02-18T18:24:52.533" v="1961" actId="20577"/>
-          <ac:spMkLst>
-            <pc:docMk/>
-            <pc:sldMk cId="3836707026" sldId="269"/>
-            <ac:spMk id="2" creationId="{F92EC9F5-BA9F-4F45-E562-22893BB2F2C1}"/>
+            <pc:sldMk cId="231334887" sldId="276"/>
+            <ac:spMk id="5" creationId="{4A0B7773-16A2-EF73-FE8C-006B168A86AA}"/>
           </ac:spMkLst>
         </pc:spChg>
         <pc:spChg chg="mod">
-          <ac:chgData name="Frommer, Ian Dr. (EDU)" userId="28ca3ff0-544f-450a-928b-99e19cf49b89" providerId="ADAL" clId="{0239818E-FECA-4149-A441-07619F1C3CDC}" dt="2025-02-19T13:43:54.374" v="2500" actId="20577"/>
+          <ac:chgData name="Frommer, Ian Dr. (EDU)" userId="28ca3ff0-544f-450a-928b-99e19cf49b89" providerId="ADAL" clId="{FDDA6EB0-4FD6-4516-ACA5-A4CAC6441DA7}" dt="2026-02-11T13:24:39.809" v="74" actId="1036"/>
           <ac:spMkLst>
             <pc:docMk/>
-            <pc:sldMk cId="3836707026" sldId="269"/>
-            <ac:spMk id="3" creationId="{A50FECED-4337-0FA0-4956-6D6E17A2798F}"/>
+            <pc:sldMk cId="231334887" sldId="276"/>
+            <ac:spMk id="6" creationId="{224F1692-6D6E-F63D-A718-25F5B5F1FAF6}"/>
           </ac:spMkLst>
         </pc:spChg>
-        <pc:picChg chg="add mod">
-          <ac:chgData name="Frommer, Ian Dr. (EDU)" userId="28ca3ff0-544f-450a-928b-99e19cf49b89" providerId="ADAL" clId="{0239818E-FECA-4149-A441-07619F1C3CDC}" dt="2025-02-19T13:54:15.023" v="2567" actId="1076"/>
+        <pc:graphicFrameChg chg="mod">
+          <ac:chgData name="Frommer, Ian Dr. (EDU)" userId="28ca3ff0-544f-450a-928b-99e19cf49b89" providerId="ADAL" clId="{FDDA6EB0-4FD6-4516-ACA5-A4CAC6441DA7}" dt="2026-02-11T13:24:53.327" v="76" actId="1076"/>
+          <ac:graphicFrameMkLst>
+            <pc:docMk/>
+            <pc:sldMk cId="231334887" sldId="276"/>
+            <ac:graphicFrameMk id="15" creationId="{31FA09FE-811E-865F-EE3D-AD763F986752}"/>
+          </ac:graphicFrameMkLst>
+        </pc:graphicFrameChg>
+        <pc:picChg chg="add del mod">
+          <ac:chgData name="Frommer, Ian Dr. (EDU)" userId="28ca3ff0-544f-450a-928b-99e19cf49b89" providerId="ADAL" clId="{FDDA6EB0-4FD6-4516-ACA5-A4CAC6441DA7}" dt="2026-02-11T13:27:00.719" v="197" actId="478"/>
           <ac:picMkLst>
             <pc:docMk/>
-            <pc:sldMk cId="3836707026" sldId="269"/>
-            <ac:picMk id="5" creationId="{626A721A-DDD3-F143-35B5-E7FFABE3F893}"/>
+            <pc:sldMk cId="231334887" sldId="276"/>
+            <ac:picMk id="7" creationId="{979E86FB-9D95-6D1B-6410-9822FDA9C9D9}"/>
           </ac:picMkLst>
         </pc:picChg>
+        <pc:picChg chg="add del mod">
+          <ac:chgData name="Frommer, Ian Dr. (EDU)" userId="28ca3ff0-544f-450a-928b-99e19cf49b89" providerId="ADAL" clId="{FDDA6EB0-4FD6-4516-ACA5-A4CAC6441DA7}" dt="2026-02-11T13:26:58.003" v="195" actId="478"/>
+          <ac:picMkLst>
+            <pc:docMk/>
+            <pc:sldMk cId="231334887" sldId="276"/>
+            <ac:picMk id="8" creationId="{8309A982-B068-14B7-E27D-D8EB598F2185}"/>
+          </ac:picMkLst>
+        </pc:picChg>
+        <pc:picChg chg="add del mod">
+          <ac:chgData name="Frommer, Ian Dr. (EDU)" userId="28ca3ff0-544f-450a-928b-99e19cf49b89" providerId="ADAL" clId="{FDDA6EB0-4FD6-4516-ACA5-A4CAC6441DA7}" dt="2026-02-11T13:26:55.349" v="193" actId="478"/>
+          <ac:picMkLst>
+            <pc:docMk/>
+            <pc:sldMk cId="231334887" sldId="276"/>
+            <ac:picMk id="9" creationId="{87109917-0382-7667-577F-5A5622ADC8C2}"/>
+          </ac:picMkLst>
+        </pc:picChg>
+        <pc:picChg chg="add del mod ord">
+          <ac:chgData name="Frommer, Ian Dr. (EDU)" userId="28ca3ff0-544f-450a-928b-99e19cf49b89" providerId="ADAL" clId="{FDDA6EB0-4FD6-4516-ACA5-A4CAC6441DA7}" dt="2026-02-11T13:27:07.983" v="202" actId="478"/>
+          <ac:picMkLst>
+            <pc:docMk/>
+            <pc:sldMk cId="231334887" sldId="276"/>
+            <ac:picMk id="10" creationId="{316455EF-A815-1A0F-3B8F-2E8EA62B5A3B}"/>
+          </ac:picMkLst>
+        </pc:picChg>
+        <pc:picChg chg="add del mod">
+          <ac:chgData name="Frommer, Ian Dr. (EDU)" userId="28ca3ff0-544f-450a-928b-99e19cf49b89" providerId="ADAL" clId="{FDDA6EB0-4FD6-4516-ACA5-A4CAC6441DA7}" dt="2026-02-11T13:26:52.563" v="191" actId="1035"/>
+          <ac:picMkLst>
+            <pc:docMk/>
+            <pc:sldMk cId="231334887" sldId="276"/>
+            <ac:picMk id="11" creationId="{DCE608B6-6222-C372-066C-F5A276C416B8}"/>
+          </ac:picMkLst>
+        </pc:picChg>
+        <pc:picChg chg="add del mod">
+          <ac:chgData name="Frommer, Ian Dr. (EDU)" userId="28ca3ff0-544f-450a-928b-99e19cf49b89" providerId="ADAL" clId="{FDDA6EB0-4FD6-4516-ACA5-A4CAC6441DA7}" dt="2026-02-11T13:27:15.019" v="205" actId="1076"/>
+          <ac:picMkLst>
+            <pc:docMk/>
+            <pc:sldMk cId="231334887" sldId="276"/>
+            <ac:picMk id="13" creationId="{CBAF953E-03E2-68E2-5166-7CE359342A80}"/>
+          </ac:picMkLst>
+        </pc:picChg>
+        <pc:cxnChg chg="mod">
+          <ac:chgData name="Frommer, Ian Dr. (EDU)" userId="28ca3ff0-544f-450a-928b-99e19cf49b89" providerId="ADAL" clId="{FDDA6EB0-4FD6-4516-ACA5-A4CAC6441DA7}" dt="2026-02-11T13:25:10.460" v="93" actId="1035"/>
+          <ac:cxnSpMkLst>
+            <pc:docMk/>
+            <pc:sldMk cId="231334887" sldId="276"/>
+            <ac:cxnSpMk id="12" creationId="{BA520CE4-DD4E-19DD-872D-45A347B835DE}"/>
+          </ac:cxnSpMkLst>
+        </pc:cxnChg>
       </pc:sldChg>
-      <pc:sldChg chg="modSp new mod">
-        <pc:chgData name="Frommer, Ian Dr. (EDU)" userId="28ca3ff0-544f-450a-928b-99e19cf49b89" providerId="ADAL" clId="{0239818E-FECA-4149-A441-07619F1C3CDC}" dt="2025-02-19T13:41:37.546" v="2410" actId="5793"/>
+      <pc:sldChg chg="new del">
+        <pc:chgData name="Frommer, Ian Dr. (EDU)" userId="28ca3ff0-544f-450a-928b-99e19cf49b89" providerId="ADAL" clId="{FDDA6EB0-4FD6-4516-ACA5-A4CAC6441DA7}" dt="2026-02-11T13:21:56.328" v="1" actId="680"/>
         <pc:sldMkLst>
           <pc:docMk/>
-          <pc:sldMk cId="2320473379" sldId="270"/>
+          <pc:sldMk cId="951542725" sldId="276"/>
         </pc:sldMkLst>
-        <pc:spChg chg="mod">
-          <ac:chgData name="Frommer, Ian Dr. (EDU)" userId="28ca3ff0-544f-450a-928b-99e19cf49b89" providerId="ADAL" clId="{0239818E-FECA-4149-A441-07619F1C3CDC}" dt="2025-02-19T13:23:59.651" v="2185" actId="20577"/>
-          <ac:spMkLst>
-            <pc:docMk/>
-            <pc:sldMk cId="2320473379" sldId="270"/>
-            <ac:spMk id="2" creationId="{17D35D92-E003-1AE5-0BCE-8CB874221286}"/>
-          </ac:spMkLst>
-        </pc:spChg>
-        <pc:spChg chg="mod">
-          <ac:chgData name="Frommer, Ian Dr. (EDU)" userId="28ca3ff0-544f-450a-928b-99e19cf49b89" providerId="ADAL" clId="{0239818E-FECA-4149-A441-07619F1C3CDC}" dt="2025-02-19T13:41:37.546" v="2410" actId="5793"/>
-          <ac:spMkLst>
-            <pc:docMk/>
-            <pc:sldMk cId="2320473379" sldId="270"/>
-            <ac:spMk id="3" creationId="{568D5765-FACC-3868-CA4E-3051B620171C}"/>
-          </ac:spMkLst>
-        </pc:spChg>
-      </pc:sldChg>
-      <pc:sldChg chg="modSp new mod">
-        <pc:chgData name="Frommer, Ian Dr. (EDU)" userId="28ca3ff0-544f-450a-928b-99e19cf49b89" providerId="ADAL" clId="{0239818E-FECA-4149-A441-07619F1C3CDC}" dt="2025-02-19T13:53:34.773" v="2564" actId="27636"/>
-        <pc:sldMkLst>
-          <pc:docMk/>
-          <pc:sldMk cId="640893172" sldId="271"/>
-        </pc:sldMkLst>
-        <pc:spChg chg="mod">
-          <ac:chgData name="Frommer, Ian Dr. (EDU)" userId="28ca3ff0-544f-450a-928b-99e19cf49b89" providerId="ADAL" clId="{0239818E-FECA-4149-A441-07619F1C3CDC}" dt="2025-02-19T13:53:27.613" v="2562" actId="404"/>
-          <ac:spMkLst>
-            <pc:docMk/>
-            <pc:sldMk cId="640893172" sldId="271"/>
-            <ac:spMk id="2" creationId="{154C858F-309E-DFAB-E83B-E402E9D1B576}"/>
-          </ac:spMkLst>
-        </pc:spChg>
-        <pc:spChg chg="mod">
-          <ac:chgData name="Frommer, Ian Dr. (EDU)" userId="28ca3ff0-544f-450a-928b-99e19cf49b89" providerId="ADAL" clId="{0239818E-FECA-4149-A441-07619F1C3CDC}" dt="2025-02-19T13:53:34.773" v="2564" actId="27636"/>
-          <ac:spMkLst>
-            <pc:docMk/>
-            <pc:sldMk cId="640893172" sldId="271"/>
-            <ac:spMk id="3" creationId="{F0B4D2A3-949A-B9B8-859E-9200BF3C3B1D}"/>
-          </ac:spMkLst>
-        </pc:spChg>
-      </pc:sldChg>
-      <pc:sldChg chg="addSp modSp new mod modAnim">
-        <pc:chgData name="Frommer, Ian Dr. (EDU)" userId="28ca3ff0-544f-450a-928b-99e19cf49b89" providerId="ADAL" clId="{0239818E-FECA-4149-A441-07619F1C3CDC}" dt="2025-02-19T14:23:08.012" v="3003" actId="20577"/>
-        <pc:sldMkLst>
-          <pc:docMk/>
-          <pc:sldMk cId="2691320128" sldId="272"/>
-        </pc:sldMkLst>
-        <pc:spChg chg="mod">
-          <ac:chgData name="Frommer, Ian Dr. (EDU)" userId="28ca3ff0-544f-450a-928b-99e19cf49b89" providerId="ADAL" clId="{0239818E-FECA-4149-A441-07619F1C3CDC}" dt="2025-02-19T13:54:28.982" v="2593" actId="20577"/>
-          <ac:spMkLst>
-            <pc:docMk/>
-            <pc:sldMk cId="2691320128" sldId="272"/>
-            <ac:spMk id="2" creationId="{E833E8CD-08E6-F420-3E4E-40840684B8B0}"/>
-          </ac:spMkLst>
-        </pc:spChg>
-        <pc:spChg chg="mod">
-          <ac:chgData name="Frommer, Ian Dr. (EDU)" userId="28ca3ff0-544f-450a-928b-99e19cf49b89" providerId="ADAL" clId="{0239818E-FECA-4149-A441-07619F1C3CDC}" dt="2025-02-19T14:23:08.012" v="3003" actId="20577"/>
-          <ac:spMkLst>
-            <pc:docMk/>
-            <pc:sldMk cId="2691320128" sldId="272"/>
-            <ac:spMk id="3" creationId="{095D923B-70A3-A729-1C8F-58696527344E}"/>
-          </ac:spMkLst>
-        </pc:spChg>
-        <pc:picChg chg="add mod modCrop">
-          <ac:chgData name="Frommer, Ian Dr. (EDU)" userId="28ca3ff0-544f-450a-928b-99e19cf49b89" providerId="ADAL" clId="{0239818E-FECA-4149-A441-07619F1C3CDC}" dt="2025-02-19T13:55:34.633" v="2597" actId="1076"/>
-          <ac:picMkLst>
-            <pc:docMk/>
-            <pc:sldMk cId="2691320128" sldId="272"/>
-            <ac:picMk id="4" creationId="{A5B2B100-CEF9-79E6-C052-7C6633F20F09}"/>
-          </ac:picMkLst>
-        </pc:picChg>
-        <pc:picChg chg="add mod modCrop">
-          <ac:chgData name="Frommer, Ian Dr. (EDU)" userId="28ca3ff0-544f-450a-928b-99e19cf49b89" providerId="ADAL" clId="{0239818E-FECA-4149-A441-07619F1C3CDC}" dt="2025-02-19T13:56:05.202" v="2602" actId="1076"/>
-          <ac:picMkLst>
-            <pc:docMk/>
-            <pc:sldMk cId="2691320128" sldId="272"/>
-            <ac:picMk id="5" creationId="{26DC2F3D-34A3-568A-CA9A-35717B7698F6}"/>
-          </ac:picMkLst>
-        </pc:picChg>
-      </pc:sldChg>
-      <pc:sldChg chg="modSp new mod">
-        <pc:chgData name="Frommer, Ian Dr. (EDU)" userId="28ca3ff0-544f-450a-928b-99e19cf49b89" providerId="ADAL" clId="{0239818E-FECA-4149-A441-07619F1C3CDC}" dt="2025-02-19T14:17:05.644" v="2856" actId="20577"/>
-        <pc:sldMkLst>
-          <pc:docMk/>
-          <pc:sldMk cId="1497406216" sldId="273"/>
-        </pc:sldMkLst>
-        <pc:spChg chg="mod">
-          <ac:chgData name="Frommer, Ian Dr. (EDU)" userId="28ca3ff0-544f-450a-928b-99e19cf49b89" providerId="ADAL" clId="{0239818E-FECA-4149-A441-07619F1C3CDC}" dt="2025-02-19T14:17:05.644" v="2856" actId="20577"/>
-          <ac:spMkLst>
-            <pc:docMk/>
-            <pc:sldMk cId="1497406216" sldId="273"/>
-            <ac:spMk id="2" creationId="{D73167C1-C967-E498-D35E-0AEFE8939314}"/>
-          </ac:spMkLst>
-        </pc:spChg>
-        <pc:spChg chg="mod">
-          <ac:chgData name="Frommer, Ian Dr. (EDU)" userId="28ca3ff0-544f-450a-928b-99e19cf49b89" providerId="ADAL" clId="{0239818E-FECA-4149-A441-07619F1C3CDC}" dt="2025-02-19T14:16:54.737" v="2815" actId="404"/>
-          <ac:spMkLst>
-            <pc:docMk/>
-            <pc:sldMk cId="1497406216" sldId="273"/>
-            <ac:spMk id="3" creationId="{E0AF8D6F-FB0F-389C-ED9A-5FB6CF550264}"/>
-          </ac:spMkLst>
-        </pc:spChg>
-      </pc:sldChg>
-      <pc:sldChg chg="addSp modSp new mod modAnim">
-        <pc:chgData name="Frommer, Ian Dr. (EDU)" userId="28ca3ff0-544f-450a-928b-99e19cf49b89" providerId="ADAL" clId="{0239818E-FECA-4149-A441-07619F1C3CDC}" dt="2025-02-19T14:21:28.987" v="2969"/>
-        <pc:sldMkLst>
-          <pc:docMk/>
-          <pc:sldMk cId="3024276570" sldId="274"/>
-        </pc:sldMkLst>
-        <pc:spChg chg="mod">
-          <ac:chgData name="Frommer, Ian Dr. (EDU)" userId="28ca3ff0-544f-450a-928b-99e19cf49b89" providerId="ADAL" clId="{0239818E-FECA-4149-A441-07619F1C3CDC}" dt="2025-02-19T14:20:05.581" v="2951" actId="27636"/>
-          <ac:spMkLst>
-            <pc:docMk/>
-            <pc:sldMk cId="3024276570" sldId="274"/>
-            <ac:spMk id="2" creationId="{3BF73C5E-C87E-32ED-37CF-AACA1A48C59F}"/>
-          </ac:spMkLst>
-        </pc:spChg>
-        <pc:spChg chg="mod">
-          <ac:chgData name="Frommer, Ian Dr. (EDU)" userId="28ca3ff0-544f-450a-928b-99e19cf49b89" providerId="ADAL" clId="{0239818E-FECA-4149-A441-07619F1C3CDC}" dt="2025-02-19T14:20:33.706" v="2956" actId="13926"/>
-          <ac:spMkLst>
-            <pc:docMk/>
-            <pc:sldMk cId="3024276570" sldId="274"/>
-            <ac:spMk id="3" creationId="{8849E534-7C25-0FE5-304D-1DE69EFB21B7}"/>
-          </ac:spMkLst>
-        </pc:spChg>
-        <pc:spChg chg="add mod">
-          <ac:chgData name="Frommer, Ian Dr. (EDU)" userId="28ca3ff0-544f-450a-928b-99e19cf49b89" providerId="ADAL" clId="{0239818E-FECA-4149-A441-07619F1C3CDC}" dt="2025-02-19T14:21:18.593" v="2968" actId="27636"/>
-          <ac:spMkLst>
-            <pc:docMk/>
-            <pc:sldMk cId="3024276570" sldId="274"/>
-            <ac:spMk id="4" creationId="{B4E42E79-8AA6-88E9-EA53-573F69D06164}"/>
-          </ac:spMkLst>
-        </pc:spChg>
-      </pc:sldChg>
-      <pc:sldChg chg="modSp new mod">
-        <pc:chgData name="Frommer, Ian Dr. (EDU)" userId="28ca3ff0-544f-450a-928b-99e19cf49b89" providerId="ADAL" clId="{0239818E-FECA-4149-A441-07619F1C3CDC}" dt="2025-02-19T14:57:15.227" v="3694" actId="20577"/>
-        <pc:sldMkLst>
-          <pc:docMk/>
-          <pc:sldMk cId="862340889" sldId="275"/>
-        </pc:sldMkLst>
-        <pc:spChg chg="mod">
-          <ac:chgData name="Frommer, Ian Dr. (EDU)" userId="28ca3ff0-544f-450a-928b-99e19cf49b89" providerId="ADAL" clId="{0239818E-FECA-4149-A441-07619F1C3CDC}" dt="2025-02-19T14:57:15.227" v="3694" actId="20577"/>
-          <ac:spMkLst>
-            <pc:docMk/>
-            <pc:sldMk cId="862340889" sldId="275"/>
-            <ac:spMk id="2" creationId="{AE24C350-0B21-36ED-84FB-A77AAE3DFF37}"/>
-          </ac:spMkLst>
-        </pc:spChg>
-        <pc:spChg chg="mod">
-          <ac:chgData name="Frommer, Ian Dr. (EDU)" userId="28ca3ff0-544f-450a-928b-99e19cf49b89" providerId="ADAL" clId="{0239818E-FECA-4149-A441-07619F1C3CDC}" dt="2025-02-19T14:46:39.910" v="3192" actId="20577"/>
-          <ac:spMkLst>
-            <pc:docMk/>
-            <pc:sldMk cId="862340889" sldId="275"/>
-            <ac:spMk id="3" creationId="{D4933BF1-BB59-CA8A-922C-7E01C71BE37B}"/>
-          </ac:spMkLst>
-        </pc:spChg>
       </pc:sldChg>
     </pc:docChg>
   </pc:docChgLst>
@@ -626,7 +439,7 @@
           <a:p>
             <a:fld id="{03D5171A-96DB-4929-B1AD-6FA109143C25}" type="datetimeFigureOut">
               <a:rPr lang="en-US" smtClean="0"/>
-              <a:t>2/18/2025</a:t>
+              <a:t>2/11/2026</a:t>
             </a:fld>
             <a:endParaRPr lang="en-US"/>
           </a:p>
@@ -982,7 +795,13 @@
   <p:cSld>
     <p:spTree>
       <p:nvGrpSpPr>
-        <p:cNvPr id="1" name=""/>
+        <p:cNvPr id="1" name="">
+          <a:extLst>
+            <a:ext uri="{FF2B5EF4-FFF2-40B4-BE49-F238E27FC236}">
+              <a16:creationId xmlns:a16="http://schemas.microsoft.com/office/drawing/2014/main" id="{7DADA66F-79F2-DFBF-F141-6430B47D2F2E}"/>
+            </a:ext>
+          </a:extLst>
+        </p:cNvPr>
         <p:cNvGrpSpPr/>
         <p:nvPr/>
       </p:nvGrpSpPr>
@@ -996,7 +815,13 @@
       </p:grpSpPr>
       <p:sp>
         <p:nvSpPr>
-          <p:cNvPr id="2" name="Slide Image Placeholder 1"/>
+          <p:cNvPr id="2" name="Slide Image Placeholder 1">
+            <a:extLst>
+              <a:ext uri="{FF2B5EF4-FFF2-40B4-BE49-F238E27FC236}">
+                <a16:creationId xmlns:a16="http://schemas.microsoft.com/office/drawing/2014/main" id="{AD95FB1A-2DEC-16CA-389A-74E85514A3A6}"/>
+              </a:ext>
+            </a:extLst>
+          </p:cNvPr>
           <p:cNvSpPr>
             <a:spLocks noGrp="1" noRot="1" noChangeAspect="1"/>
           </p:cNvSpPr>
@@ -1008,7 +833,13 @@
       </p:sp>
       <p:sp>
         <p:nvSpPr>
-          <p:cNvPr id="3" name="Notes Placeholder 2"/>
+          <p:cNvPr id="3" name="Notes Placeholder 2">
+            <a:extLst>
+              <a:ext uri="{FF2B5EF4-FFF2-40B4-BE49-F238E27FC236}">
+                <a16:creationId xmlns:a16="http://schemas.microsoft.com/office/drawing/2014/main" id="{4FBCD965-34ED-CD0A-E5B6-AC77B8C57AAF}"/>
+              </a:ext>
+            </a:extLst>
+          </p:cNvPr>
           <p:cNvSpPr>
             <a:spLocks noGrp="1"/>
           </p:cNvSpPr>
@@ -1021,16 +852,19 @@
           <a:bodyPr/>
           <a:lstStyle/>
           <a:p>
-            <a:r>
-              <a:rPr lang="en-US" dirty="0"/>
-              <a:t>see notes</a:t>
-            </a:r>
+            <a:endParaRPr lang="en-US" dirty="0"/>
           </a:p>
         </p:txBody>
       </p:sp>
       <p:sp>
         <p:nvSpPr>
-          <p:cNvPr id="4" name="Slide Number Placeholder 3"/>
+          <p:cNvPr id="4" name="Slide Number Placeholder 3">
+            <a:extLst>
+              <a:ext uri="{FF2B5EF4-FFF2-40B4-BE49-F238E27FC236}">
+                <a16:creationId xmlns:a16="http://schemas.microsoft.com/office/drawing/2014/main" id="{E540E7BA-C4E3-E0BA-9BB8-76E56D82C32D}"/>
+              </a:ext>
+            </a:extLst>
+          </p:cNvPr>
           <p:cNvSpPr>
             <a:spLocks noGrp="1"/>
           </p:cNvSpPr>
@@ -1043,7 +877,7 @@
           <a:bodyPr/>
           <a:lstStyle/>
           <a:p>
-            <a:fld id="{9932375E-5EE2-4DE0-9D4A-53024C681539}" type="slidenum">
+            <a:fld id="{EC94955D-7326-4DFC-9543-A1899A86CF7B}" type="slidenum">
               <a:rPr lang="en-US" smtClean="0"/>
               <a:t>5</a:t>
             </a:fld>
@@ -1054,7 +888,7 @@
     </p:spTree>
     <p:extLst>
       <p:ext uri="{BB962C8B-B14F-4D97-AF65-F5344CB8AC3E}">
-        <p14:creationId xmlns:p14="http://schemas.microsoft.com/office/powerpoint/2010/main" val="2911627391"/>
+        <p14:creationId xmlns:p14="http://schemas.microsoft.com/office/powerpoint/2010/main" val="3372765795"/>
       </p:ext>
     </p:extLst>
   </p:cSld>
@@ -1108,6 +942,93 @@
           <a:bodyPr/>
           <a:lstStyle/>
           <a:p>
+            <a:r>
+              <a:rPr lang="en-US" dirty="0"/>
+              <a:t>see notes</a:t>
+            </a:r>
+          </a:p>
+        </p:txBody>
+      </p:sp>
+      <p:sp>
+        <p:nvSpPr>
+          <p:cNvPr id="4" name="Slide Number Placeholder 3"/>
+          <p:cNvSpPr>
+            <a:spLocks noGrp="1"/>
+          </p:cNvSpPr>
+          <p:nvPr>
+            <p:ph type="sldNum" sz="quarter" idx="5"/>
+          </p:nvPr>
+        </p:nvSpPr>
+        <p:spPr/>
+        <p:txBody>
+          <a:bodyPr/>
+          <a:lstStyle/>
+          <a:p>
+            <a:fld id="{9932375E-5EE2-4DE0-9D4A-53024C681539}" type="slidenum">
+              <a:rPr lang="en-US" smtClean="0"/>
+              <a:t>6</a:t>
+            </a:fld>
+            <a:endParaRPr lang="en-US"/>
+          </a:p>
+        </p:txBody>
+      </p:sp>
+    </p:spTree>
+    <p:extLst>
+      <p:ext uri="{BB962C8B-B14F-4D97-AF65-F5344CB8AC3E}">
+        <p14:creationId xmlns:p14="http://schemas.microsoft.com/office/powerpoint/2010/main" val="2911627391"/>
+      </p:ext>
+    </p:extLst>
+  </p:cSld>
+  <p:clrMapOvr>
+    <a:masterClrMapping/>
+  </p:clrMapOvr>
+</p:notes>
+</file>
+
+<file path=ppt/notesSlides/notesSlide4.xml><?xml version="1.0" encoding="utf-8"?>
+<p:notes xmlns:a="http://schemas.openxmlformats.org/drawingml/2006/main" xmlns:r="http://schemas.openxmlformats.org/officeDocument/2006/relationships" xmlns:p="http://schemas.openxmlformats.org/presentationml/2006/main">
+  <p:cSld>
+    <p:spTree>
+      <p:nvGrpSpPr>
+        <p:cNvPr id="1" name=""/>
+        <p:cNvGrpSpPr/>
+        <p:nvPr/>
+      </p:nvGrpSpPr>
+      <p:grpSpPr>
+        <a:xfrm>
+          <a:off x="0" y="0"/>
+          <a:ext cx="0" cy="0"/>
+          <a:chOff x="0" y="0"/>
+          <a:chExt cx="0" cy="0"/>
+        </a:xfrm>
+      </p:grpSpPr>
+      <p:sp>
+        <p:nvSpPr>
+          <p:cNvPr id="2" name="Slide Image Placeholder 1"/>
+          <p:cNvSpPr>
+            <a:spLocks noGrp="1" noRot="1" noChangeAspect="1"/>
+          </p:cNvSpPr>
+          <p:nvPr>
+            <p:ph type="sldImg"/>
+          </p:nvPr>
+        </p:nvSpPr>
+        <p:spPr/>
+      </p:sp>
+      <p:sp>
+        <p:nvSpPr>
+          <p:cNvPr id="3" name="Notes Placeholder 2"/>
+          <p:cNvSpPr>
+            <a:spLocks noGrp="1"/>
+          </p:cNvSpPr>
+          <p:nvPr>
+            <p:ph type="body" idx="1"/>
+          </p:nvPr>
+        </p:nvSpPr>
+        <p:spPr/>
+        <p:txBody>
+          <a:bodyPr/>
+          <a:lstStyle/>
+          <a:p>
             <a:pPr marL="0" marR="0" lvl="0" indent="0" algn="l" defTabSz="914400" rtl="0" eaLnBrk="1" fontAlgn="auto" latinLnBrk="0" hangingPunct="1">
               <a:lnSpc>
                 <a:spcPct val="100000"/>
@@ -1167,7 +1088,7 @@
           <a:p>
             <a:fld id="{9932375E-5EE2-4DE0-9D4A-53024C681539}" type="slidenum">
               <a:rPr lang="en-US" smtClean="0"/>
-              <a:t>15</a:t>
+              <a:t>16</a:t>
             </a:fld>
             <a:endParaRPr lang="en-US"/>
           </a:p>
@@ -1333,7 +1254,7 @@
           <a:p>
             <a:fld id="{AA285DA3-8050-4DC5-88DE-D3777392B97A}" type="datetimeFigureOut">
               <a:rPr lang="en-US" smtClean="0"/>
-              <a:t>2/18/2025</a:t>
+              <a:t>2/11/2026</a:t>
             </a:fld>
             <a:endParaRPr lang="en-US"/>
           </a:p>
@@ -1531,7 +1452,7 @@
           <a:p>
             <a:fld id="{AA285DA3-8050-4DC5-88DE-D3777392B97A}" type="datetimeFigureOut">
               <a:rPr lang="en-US" smtClean="0"/>
-              <a:t>2/18/2025</a:t>
+              <a:t>2/11/2026</a:t>
             </a:fld>
             <a:endParaRPr lang="en-US"/>
           </a:p>
@@ -1739,7 +1660,7 @@
           <a:p>
             <a:fld id="{AA285DA3-8050-4DC5-88DE-D3777392B97A}" type="datetimeFigureOut">
               <a:rPr lang="en-US" smtClean="0"/>
-              <a:t>2/18/2025</a:t>
+              <a:t>2/11/2026</a:t>
             </a:fld>
             <a:endParaRPr lang="en-US"/>
           </a:p>
@@ -1937,7 +1858,7 @@
           <a:p>
             <a:fld id="{AA285DA3-8050-4DC5-88DE-D3777392B97A}" type="datetimeFigureOut">
               <a:rPr lang="en-US" smtClean="0"/>
-              <a:t>2/18/2025</a:t>
+              <a:t>2/11/2026</a:t>
             </a:fld>
             <a:endParaRPr lang="en-US"/>
           </a:p>
@@ -2212,7 +2133,7 @@
           <a:p>
             <a:fld id="{AA285DA3-8050-4DC5-88DE-D3777392B97A}" type="datetimeFigureOut">
               <a:rPr lang="en-US" smtClean="0"/>
-              <a:t>2/18/2025</a:t>
+              <a:t>2/11/2026</a:t>
             </a:fld>
             <a:endParaRPr lang="en-US"/>
           </a:p>
@@ -2477,7 +2398,7 @@
           <a:p>
             <a:fld id="{AA285DA3-8050-4DC5-88DE-D3777392B97A}" type="datetimeFigureOut">
               <a:rPr lang="en-US" smtClean="0"/>
-              <a:t>2/18/2025</a:t>
+              <a:t>2/11/2026</a:t>
             </a:fld>
             <a:endParaRPr lang="en-US"/>
           </a:p>
@@ -2889,7 +2810,7 @@
           <a:p>
             <a:fld id="{AA285DA3-8050-4DC5-88DE-D3777392B97A}" type="datetimeFigureOut">
               <a:rPr lang="en-US" smtClean="0"/>
-              <a:t>2/18/2025</a:t>
+              <a:t>2/11/2026</a:t>
             </a:fld>
             <a:endParaRPr lang="en-US"/>
           </a:p>
@@ -3030,7 +2951,7 @@
           <a:p>
             <a:fld id="{AA285DA3-8050-4DC5-88DE-D3777392B97A}" type="datetimeFigureOut">
               <a:rPr lang="en-US" smtClean="0"/>
-              <a:t>2/18/2025</a:t>
+              <a:t>2/11/2026</a:t>
             </a:fld>
             <a:endParaRPr lang="en-US"/>
           </a:p>
@@ -3143,7 +3064,7 @@
           <a:p>
             <a:fld id="{AA285DA3-8050-4DC5-88DE-D3777392B97A}" type="datetimeFigureOut">
               <a:rPr lang="en-US" smtClean="0"/>
-              <a:t>2/18/2025</a:t>
+              <a:t>2/11/2026</a:t>
             </a:fld>
             <a:endParaRPr lang="en-US"/>
           </a:p>
@@ -3454,7 +3375,7 @@
           <a:p>
             <a:fld id="{AA285DA3-8050-4DC5-88DE-D3777392B97A}" type="datetimeFigureOut">
               <a:rPr lang="en-US" smtClean="0"/>
-              <a:t>2/18/2025</a:t>
+              <a:t>2/11/2026</a:t>
             </a:fld>
             <a:endParaRPr lang="en-US"/>
           </a:p>
@@ -3742,7 +3663,7 @@
           <a:p>
             <a:fld id="{AA285DA3-8050-4DC5-88DE-D3777392B97A}" type="datetimeFigureOut">
               <a:rPr lang="en-US" smtClean="0"/>
-              <a:t>2/18/2025</a:t>
+              <a:t>2/11/2026</a:t>
             </a:fld>
             <a:endParaRPr lang="en-US"/>
           </a:p>
@@ -3983,7 +3904,7 @@
           <a:p>
             <a:fld id="{AA285DA3-8050-4DC5-88DE-D3777392B97A}" type="datetimeFigureOut">
               <a:rPr lang="en-US" smtClean="0"/>
-              <a:t>2/18/2025</a:t>
+              <a:t>2/11/2026</a:t>
             </a:fld>
             <a:endParaRPr lang="en-US"/>
           </a:p>
@@ -4519,6 +4440,184 @@
           <p:cNvPr id="2" name="Title 1">
             <a:extLst>
               <a:ext uri="{FF2B5EF4-FFF2-40B4-BE49-F238E27FC236}">
+                <a16:creationId xmlns:a16="http://schemas.microsoft.com/office/drawing/2014/main" id="{F92EC9F5-BA9F-4F45-E562-22893BB2F2C1}"/>
+              </a:ext>
+            </a:extLst>
+          </p:cNvPr>
+          <p:cNvSpPr>
+            <a:spLocks noGrp="1"/>
+          </p:cNvSpPr>
+          <p:nvPr>
+            <p:ph type="title"/>
+          </p:nvPr>
+        </p:nvSpPr>
+        <p:spPr/>
+        <p:txBody>
+          <a:bodyPr/>
+          <a:lstStyle/>
+          <a:p>
+            <a:r>
+              <a:rPr lang="en-US" dirty="0"/>
+              <a:t>Implement an Objective in the IP</a:t>
+            </a:r>
+          </a:p>
+        </p:txBody>
+      </p:sp>
+      <p:sp>
+        <p:nvSpPr>
+          <p:cNvPr id="3" name="Content Placeholder 2">
+            <a:extLst>
+              <a:ext uri="{FF2B5EF4-FFF2-40B4-BE49-F238E27FC236}">
+                <a16:creationId xmlns:a16="http://schemas.microsoft.com/office/drawing/2014/main" id="{A50FECED-4337-0FA0-4956-6D6E17A2798F}"/>
+              </a:ext>
+            </a:extLst>
+          </p:cNvPr>
+          <p:cNvSpPr>
+            <a:spLocks noGrp="1"/>
+          </p:cNvSpPr>
+          <p:nvPr>
+            <p:ph idx="1"/>
+          </p:nvPr>
+        </p:nvSpPr>
+        <p:spPr>
+          <a:xfrm>
+            <a:off x="536642" y="5671224"/>
+            <a:ext cx="10515600" cy="898627"/>
+          </a:xfrm>
+        </p:spPr>
+        <p:txBody>
+          <a:bodyPr>
+            <a:normAutofit fontScale="92500" lnSpcReduction="10000"/>
+          </a:bodyPr>
+          <a:lstStyle/>
+          <a:p>
+            <a:pPr marL="0" indent="0">
+              <a:buNone/>
+            </a:pPr>
+            <a:r>
+              <a:rPr lang="en-US" dirty="0"/>
+              <a:t>Now we will need a data structure for </a:t>
+            </a:r>
+            <a:r>
+              <a:rPr lang="en-US" sz="2400" dirty="0">
+                <a:latin typeface="Courier New" panose="02070309020205020404" pitchFamily="49" charset="0"/>
+                <a:cs typeface="Courier New" panose="02070309020205020404" pitchFamily="49" charset="0"/>
+              </a:rPr>
+              <a:t>P</a:t>
+            </a:r>
+            <a:r>
+              <a:rPr lang="en-US" sz="2400" baseline="-25000" dirty="0">
+                <a:latin typeface="Courier New" panose="02070309020205020404" pitchFamily="49" charset="0"/>
+                <a:cs typeface="Courier New" panose="02070309020205020404" pitchFamily="49" charset="0"/>
+              </a:rPr>
+              <a:t>i</a:t>
+            </a:r>
+            <a:r>
+              <a:rPr lang="en-US" sz="2400" dirty="0">
+                <a:latin typeface="Courier New" panose="02070309020205020404" pitchFamily="49" charset="0"/>
+                <a:cs typeface="Courier New" panose="02070309020205020404" pitchFamily="49" charset="0"/>
+              </a:rPr>
+              <a:t>(j)</a:t>
+            </a:r>
+            <a:r>
+              <a:rPr lang="en-US" dirty="0"/>
+              <a:t>.</a:t>
+            </a:r>
+          </a:p>
+          <a:p>
+            <a:pPr marL="0" indent="0">
+              <a:buNone/>
+            </a:pPr>
+            <a:r>
+              <a:rPr lang="en-US" dirty="0"/>
+              <a:t>We can use </a:t>
+            </a:r>
+            <a:r>
+              <a:rPr lang="en-US" sz="2600" dirty="0" err="1">
+                <a:latin typeface="Courier New" panose="02070309020205020404" pitchFamily="49" charset="0"/>
+                <a:cs typeface="Courier New" panose="02070309020205020404" pitchFamily="49" charset="0"/>
+              </a:rPr>
+              <a:t>smp_utils.prefs_to_ranks</a:t>
+            </a:r>
+            <a:r>
+              <a:rPr lang="en-US" sz="2600" dirty="0">
+                <a:latin typeface="Courier New" panose="02070309020205020404" pitchFamily="49" charset="0"/>
+                <a:cs typeface="Courier New" panose="02070309020205020404" pitchFamily="49" charset="0"/>
+              </a:rPr>
+              <a:t>.</a:t>
+            </a:r>
+            <a:endParaRPr lang="en-US" dirty="0">
+              <a:latin typeface="Courier New" panose="02070309020205020404" pitchFamily="49" charset="0"/>
+              <a:cs typeface="Courier New" panose="02070309020205020404" pitchFamily="49" charset="0"/>
+            </a:endParaRPr>
+          </a:p>
+        </p:txBody>
+      </p:sp>
+      <p:pic>
+        <p:nvPicPr>
+          <p:cNvPr id="5" name="Picture 4">
+            <a:extLst>
+              <a:ext uri="{FF2B5EF4-FFF2-40B4-BE49-F238E27FC236}">
+                <a16:creationId xmlns:a16="http://schemas.microsoft.com/office/drawing/2014/main" id="{626A721A-DDD3-F143-35B5-E7FFABE3F893}"/>
+              </a:ext>
+            </a:extLst>
+          </p:cNvPr>
+          <p:cNvPicPr>
+            <a:picLocks noChangeAspect="1"/>
+          </p:cNvPicPr>
+          <p:nvPr/>
+        </p:nvPicPr>
+        <p:blipFill>
+          <a:blip r:embed="rId2"/>
+          <a:stretch>
+            <a:fillRect/>
+          </a:stretch>
+        </p:blipFill>
+        <p:spPr>
+          <a:xfrm>
+            <a:off x="0" y="1513732"/>
+            <a:ext cx="12192000" cy="4064000"/>
+          </a:xfrm>
+          <a:prstGeom prst="rect">
+            <a:avLst/>
+          </a:prstGeom>
+        </p:spPr>
+      </p:pic>
+    </p:spTree>
+    <p:extLst>
+      <p:ext uri="{BB962C8B-B14F-4D97-AF65-F5344CB8AC3E}">
+        <p14:creationId xmlns:p14="http://schemas.microsoft.com/office/powerpoint/2010/main" val="3836707026"/>
+      </p:ext>
+    </p:extLst>
+  </p:cSld>
+  <p:clrMapOvr>
+    <a:masterClrMapping/>
+  </p:clrMapOvr>
+</p:sld>
+</file>
+
+<file path=ppt/slides/slide11.xml><?xml version="1.0" encoding="utf-8"?>
+<p:sld xmlns:a="http://schemas.openxmlformats.org/drawingml/2006/main" xmlns:r="http://schemas.openxmlformats.org/officeDocument/2006/relationships" xmlns:p="http://schemas.openxmlformats.org/presentationml/2006/main">
+  <p:cSld>
+    <p:spTree>
+      <p:nvGrpSpPr>
+        <p:cNvPr id="1" name=""/>
+        <p:cNvGrpSpPr/>
+        <p:nvPr/>
+      </p:nvGrpSpPr>
+      <p:grpSpPr>
+        <a:xfrm>
+          <a:off x="0" y="0"/>
+          <a:ext cx="0" cy="0"/>
+          <a:chOff x="0" y="0"/>
+          <a:chExt cx="0" cy="0"/>
+        </a:xfrm>
+      </p:grpSpPr>
+      <p:sp>
+        <p:nvSpPr>
+          <p:cNvPr id="2" name="Title 1">
+            <a:extLst>
+              <a:ext uri="{FF2B5EF4-FFF2-40B4-BE49-F238E27FC236}">
                 <a16:creationId xmlns:a16="http://schemas.microsoft.com/office/drawing/2014/main" id="{154C858F-309E-DFAB-E83B-E402E9D1B576}"/>
               </a:ext>
             </a:extLst>
@@ -4903,7 +5002,7 @@
 </p:sld>
 </file>
 
-<file path=ppt/slides/slide11.xml><?xml version="1.0" encoding="utf-8"?>
+<file path=ppt/slides/slide12.xml><?xml version="1.0" encoding="utf-8"?>
 <p:sld xmlns:a="http://schemas.openxmlformats.org/drawingml/2006/main" xmlns:r="http://schemas.openxmlformats.org/officeDocument/2006/relationships" xmlns:p="http://schemas.openxmlformats.org/presentationml/2006/main">
   <p:cSld>
     <p:spTree>
@@ -5636,7 +5735,7 @@
 </p:sld>
 </file>
 
-<file path=ppt/slides/slide12.xml><?xml version="1.0" encoding="utf-8"?>
+<file path=ppt/slides/slide13.xml><?xml version="1.0" encoding="utf-8"?>
 <p:sld xmlns:a="http://schemas.openxmlformats.org/drawingml/2006/main" xmlns:r="http://schemas.openxmlformats.org/officeDocument/2006/relationships" xmlns:p="http://schemas.openxmlformats.org/presentationml/2006/main">
   <p:cSld>
     <p:spTree>
@@ -5982,7 +6081,7 @@
 </p:sld>
 </file>
 
-<file path=ppt/slides/slide13.xml><?xml version="1.0" encoding="utf-8"?>
+<file path=ppt/slides/slide14.xml><?xml version="1.0" encoding="utf-8"?>
 <p:sld xmlns:a="http://schemas.openxmlformats.org/drawingml/2006/main" xmlns:r="http://schemas.openxmlformats.org/officeDocument/2006/relationships" xmlns:p="http://schemas.openxmlformats.org/presentationml/2006/main">
   <p:cSld>
     <p:spTree>
@@ -6704,113 +6803,6 @@
 </p:sld>
 </file>
 
-<file path=ppt/slides/slide14.xml><?xml version="1.0" encoding="utf-8"?>
-<p:sld xmlns:a="http://schemas.openxmlformats.org/drawingml/2006/main" xmlns:r="http://schemas.openxmlformats.org/officeDocument/2006/relationships" xmlns:p="http://schemas.openxmlformats.org/presentationml/2006/main">
-  <p:cSld>
-    <p:spTree>
-      <p:nvGrpSpPr>
-        <p:cNvPr id="1" name=""/>
-        <p:cNvGrpSpPr/>
-        <p:nvPr/>
-      </p:nvGrpSpPr>
-      <p:grpSpPr>
-        <a:xfrm>
-          <a:off x="0" y="0"/>
-          <a:ext cx="0" cy="0"/>
-          <a:chOff x="0" y="0"/>
-          <a:chExt cx="0" cy="0"/>
-        </a:xfrm>
-      </p:grpSpPr>
-      <p:sp>
-        <p:nvSpPr>
-          <p:cNvPr id="2" name="Title 1">
-            <a:extLst>
-              <a:ext uri="{FF2B5EF4-FFF2-40B4-BE49-F238E27FC236}">
-                <a16:creationId xmlns:a16="http://schemas.microsoft.com/office/drawing/2014/main" id="{AE24C350-0B21-36ED-84FB-A77AAE3DFF37}"/>
-              </a:ext>
-            </a:extLst>
-          </p:cNvPr>
-          <p:cNvSpPr>
-            <a:spLocks noGrp="1"/>
-          </p:cNvSpPr>
-          <p:nvPr>
-            <p:ph type="title"/>
-          </p:nvPr>
-        </p:nvSpPr>
-        <p:spPr/>
-        <p:txBody>
-          <a:bodyPr/>
-          <a:lstStyle/>
-          <a:p>
-            <a:r>
-              <a:rPr lang="en-US" dirty="0"/>
-              <a:t>Gale-Shapley (G-S) Implementation</a:t>
-            </a:r>
-          </a:p>
-        </p:txBody>
-      </p:sp>
-      <p:sp>
-        <p:nvSpPr>
-          <p:cNvPr id="3" name="Content Placeholder 2">
-            <a:extLst>
-              <a:ext uri="{FF2B5EF4-FFF2-40B4-BE49-F238E27FC236}">
-                <a16:creationId xmlns:a16="http://schemas.microsoft.com/office/drawing/2014/main" id="{D4933BF1-BB59-CA8A-922C-7E01C71BE37B}"/>
-              </a:ext>
-            </a:extLst>
-          </p:cNvPr>
-          <p:cNvSpPr>
-            <a:spLocks noGrp="1"/>
-          </p:cNvSpPr>
-          <p:nvPr>
-            <p:ph idx="1"/>
-          </p:nvPr>
-        </p:nvSpPr>
-        <p:spPr/>
-        <p:txBody>
-          <a:bodyPr/>
-          <a:lstStyle/>
-          <a:p>
-            <a:r>
-              <a:rPr lang="en-US" dirty="0"/>
-              <a:t>Implement yourself as an exercise, or</a:t>
-            </a:r>
-          </a:p>
-          <a:p>
-            <a:r>
-              <a:rPr lang="en-US" dirty="0"/>
-              <a:t>find good code and test it carefully</a:t>
-            </a:r>
-          </a:p>
-          <a:p>
-            <a:endParaRPr lang="en-US" dirty="0"/>
-          </a:p>
-          <a:p>
-            <a:endParaRPr lang="en-US" dirty="0"/>
-          </a:p>
-          <a:p>
-            <a:pPr marL="0" indent="0">
-              <a:buNone/>
-            </a:pPr>
-            <a:r>
-              <a:rPr lang="en-US" dirty="0"/>
-              <a:t>Time permitting – let’s run some G-S code in class</a:t>
-            </a:r>
-          </a:p>
-        </p:txBody>
-      </p:sp>
-    </p:spTree>
-    <p:extLst>
-      <p:ext uri="{BB962C8B-B14F-4D97-AF65-F5344CB8AC3E}">
-        <p14:creationId xmlns:p14="http://schemas.microsoft.com/office/powerpoint/2010/main" val="862340889"/>
-      </p:ext>
-    </p:extLst>
-  </p:cSld>
-  <p:clrMapOvr>
-    <a:masterClrMapping/>
-  </p:clrMapOvr>
-</p:sld>
-</file>
-
 <file path=ppt/slides/slide15.xml><?xml version="1.0" encoding="utf-8"?>
 <p:sld xmlns:a="http://schemas.openxmlformats.org/drawingml/2006/main" xmlns:r="http://schemas.openxmlformats.org/officeDocument/2006/relationships" xmlns:p="http://schemas.openxmlformats.org/presentationml/2006/main">
   <p:cSld>
@@ -6833,6 +6825,113 @@
           <p:cNvPr id="2" name="Title 1">
             <a:extLst>
               <a:ext uri="{FF2B5EF4-FFF2-40B4-BE49-F238E27FC236}">
+                <a16:creationId xmlns:a16="http://schemas.microsoft.com/office/drawing/2014/main" id="{AE24C350-0B21-36ED-84FB-A77AAE3DFF37}"/>
+              </a:ext>
+            </a:extLst>
+          </p:cNvPr>
+          <p:cNvSpPr>
+            <a:spLocks noGrp="1"/>
+          </p:cNvSpPr>
+          <p:nvPr>
+            <p:ph type="title"/>
+          </p:nvPr>
+        </p:nvSpPr>
+        <p:spPr/>
+        <p:txBody>
+          <a:bodyPr/>
+          <a:lstStyle/>
+          <a:p>
+            <a:r>
+              <a:rPr lang="en-US" dirty="0"/>
+              <a:t>Gale-Shapley (G-S) Implementation</a:t>
+            </a:r>
+          </a:p>
+        </p:txBody>
+      </p:sp>
+      <p:sp>
+        <p:nvSpPr>
+          <p:cNvPr id="3" name="Content Placeholder 2">
+            <a:extLst>
+              <a:ext uri="{FF2B5EF4-FFF2-40B4-BE49-F238E27FC236}">
+                <a16:creationId xmlns:a16="http://schemas.microsoft.com/office/drawing/2014/main" id="{D4933BF1-BB59-CA8A-922C-7E01C71BE37B}"/>
+              </a:ext>
+            </a:extLst>
+          </p:cNvPr>
+          <p:cNvSpPr>
+            <a:spLocks noGrp="1"/>
+          </p:cNvSpPr>
+          <p:nvPr>
+            <p:ph idx="1"/>
+          </p:nvPr>
+        </p:nvSpPr>
+        <p:spPr/>
+        <p:txBody>
+          <a:bodyPr/>
+          <a:lstStyle/>
+          <a:p>
+            <a:r>
+              <a:rPr lang="en-US" dirty="0"/>
+              <a:t>Implement yourself as an exercise, or</a:t>
+            </a:r>
+          </a:p>
+          <a:p>
+            <a:r>
+              <a:rPr lang="en-US" dirty="0"/>
+              <a:t>find good code and test it carefully</a:t>
+            </a:r>
+          </a:p>
+          <a:p>
+            <a:endParaRPr lang="en-US" dirty="0"/>
+          </a:p>
+          <a:p>
+            <a:endParaRPr lang="en-US" dirty="0"/>
+          </a:p>
+          <a:p>
+            <a:pPr marL="0" indent="0">
+              <a:buNone/>
+            </a:pPr>
+            <a:r>
+              <a:rPr lang="en-US" dirty="0"/>
+              <a:t>Time permitting – let’s run some G-S code in class</a:t>
+            </a:r>
+          </a:p>
+        </p:txBody>
+      </p:sp>
+    </p:spTree>
+    <p:extLst>
+      <p:ext uri="{BB962C8B-B14F-4D97-AF65-F5344CB8AC3E}">
+        <p14:creationId xmlns:p14="http://schemas.microsoft.com/office/powerpoint/2010/main" val="862340889"/>
+      </p:ext>
+    </p:extLst>
+  </p:cSld>
+  <p:clrMapOvr>
+    <a:masterClrMapping/>
+  </p:clrMapOvr>
+</p:sld>
+</file>
+
+<file path=ppt/slides/slide16.xml><?xml version="1.0" encoding="utf-8"?>
+<p:sld xmlns:a="http://schemas.openxmlformats.org/drawingml/2006/main" xmlns:r="http://schemas.openxmlformats.org/officeDocument/2006/relationships" xmlns:p="http://schemas.openxmlformats.org/presentationml/2006/main">
+  <p:cSld>
+    <p:spTree>
+      <p:nvGrpSpPr>
+        <p:cNvPr id="1" name=""/>
+        <p:cNvGrpSpPr/>
+        <p:nvPr/>
+      </p:nvGrpSpPr>
+      <p:grpSpPr>
+        <a:xfrm>
+          <a:off x="0" y="0"/>
+          <a:ext cx="0" cy="0"/>
+          <a:chOff x="0" y="0"/>
+          <a:chExt cx="0" cy="0"/>
+        </a:xfrm>
+      </p:grpSpPr>
+      <p:sp>
+        <p:nvSpPr>
+          <p:cNvPr id="2" name="Title 1">
+            <a:extLst>
+              <a:ext uri="{FF2B5EF4-FFF2-40B4-BE49-F238E27FC236}">
                 <a16:creationId xmlns:a16="http://schemas.microsoft.com/office/drawing/2014/main" id="{76EA9B53-3CE0-EE4A-4B45-24BFFA628544}"/>
               </a:ext>
             </a:extLst>
@@ -6927,10 +7026,10 @@
           <a:p>
             <a:pPr lvl="1" fontAlgn="ctr"/>
             <a:r>
-              <a:rPr lang="en-US" dirty="0">
+              <a:rPr lang="en-US">
                 <a:latin typeface="Calibri" panose="020F0502020204030204" pitchFamily="34" charset="0"/>
               </a:rPr>
-              <a:t>tentative plans for a Coast-Guard-related guest lecture on this subject in early March</a:t>
+              <a:t>Coast-Guard-related applications of this</a:t>
             </a:r>
             <a:endParaRPr lang="en-US" dirty="0">
               <a:effectLst/>
@@ -7017,8 +7116,19 @@
                 <a:effectLst/>
                 <a:latin typeface="Calibri" panose="020F0502020204030204" pitchFamily="34" charset="0"/>
               </a:rPr>
-              <a:t>see Erasmus lecture reference on D2L</a:t>
-            </a:r>
+              <a:t>see Erasmus </a:t>
+            </a:r>
+            <a:r>
+              <a:rPr lang="en-US">
+                <a:effectLst/>
+                <a:latin typeface="Calibri" panose="020F0502020204030204" pitchFamily="34" charset="0"/>
+              </a:rPr>
+              <a:t>lecture pdf in our repo’s Reference folder</a:t>
+            </a:r>
+            <a:endParaRPr lang="en-US" dirty="0">
+              <a:effectLst/>
+              <a:latin typeface="Calibri" panose="020F0502020204030204" pitchFamily="34" charset="0"/>
+            </a:endParaRPr>
           </a:p>
         </p:txBody>
       </p:sp>
@@ -7035,7 +7145,7 @@
 </p:sld>
 </file>
 
-<file path=ppt/slides/slide16.xml><?xml version="1.0" encoding="utf-8"?>
+<file path=ppt/slides/slide17.xml><?xml version="1.0" encoding="utf-8"?>
 <p:sld xmlns:a="http://schemas.openxmlformats.org/drawingml/2006/main" xmlns:r="http://schemas.openxmlformats.org/officeDocument/2006/relationships" xmlns:p="http://schemas.openxmlformats.org/presentationml/2006/main">
   <p:cSld>
     <p:spTree>
@@ -7842,16 +7952,18 @@
         </p:nvSpPr>
         <p:spPr>
           <a:xfrm>
-            <a:off x="399089" y="933450"/>
-            <a:ext cx="11311841" cy="4659620"/>
+            <a:off x="440079" y="816717"/>
+            <a:ext cx="11311841" cy="5924551"/>
           </a:xfrm>
         </p:spPr>
         <p:txBody>
-          <a:bodyPr/>
+          <a:bodyPr>
+            <a:normAutofit fontScale="92500" lnSpcReduction="20000"/>
+          </a:bodyPr>
           <a:lstStyle/>
           <a:p>
             <a:r>
-              <a:rPr lang="en-US" sz="2200" kern="100" dirty="0">
+              <a:rPr lang="en-US" sz="2400" kern="100" dirty="0">
                 <a:effectLst/>
                 <a:latin typeface="Aptos" panose="020B0004020202020204" pitchFamily="34" charset="0"/>
                 <a:ea typeface="Aptos" panose="020B0004020202020204" pitchFamily="34" charset="0"/>
@@ -7860,7 +7972,7 @@
               <a:t>SMP only seeks a </a:t>
             </a:r>
             <a:r>
-              <a:rPr lang="en-US" sz="2200" u="sng" kern="100" dirty="0">
+              <a:rPr lang="en-US" sz="2400" u="sng" kern="100" dirty="0">
                 <a:effectLst/>
                 <a:latin typeface="Aptos" panose="020B0004020202020204" pitchFamily="34" charset="0"/>
                 <a:ea typeface="Aptos" panose="020B0004020202020204" pitchFamily="34" charset="0"/>
@@ -7869,7 +7981,7 @@
               <a:t>feasible</a:t>
             </a:r>
             <a:r>
-              <a:rPr lang="en-US" sz="2200" kern="100" dirty="0">
+              <a:rPr lang="en-US" sz="2400" kern="100" dirty="0">
                 <a:effectLst/>
                 <a:latin typeface="Aptos" panose="020B0004020202020204" pitchFamily="34" charset="0"/>
                 <a:ea typeface="Aptos" panose="020B0004020202020204" pitchFamily="34" charset="0"/>
@@ -7878,7 +7990,7 @@
               <a:t> solution, not an </a:t>
             </a:r>
             <a:r>
-              <a:rPr lang="en-US" sz="2200" u="sng" kern="100" dirty="0">
+              <a:rPr lang="en-US" sz="2400" u="sng" kern="100" dirty="0">
                 <a:effectLst/>
                 <a:latin typeface="Aptos" panose="020B0004020202020204" pitchFamily="34" charset="0"/>
                 <a:ea typeface="Aptos" panose="020B0004020202020204" pitchFamily="34" charset="0"/>
@@ -7887,7 +7999,7 @@
               <a:t>optimal</a:t>
             </a:r>
             <a:r>
-              <a:rPr lang="en-US" sz="2200" kern="100" dirty="0">
+              <a:rPr lang="en-US" sz="2400" kern="100" dirty="0">
                 <a:effectLst/>
                 <a:latin typeface="Aptos" panose="020B0004020202020204" pitchFamily="34" charset="0"/>
                 <a:ea typeface="Aptos" panose="020B0004020202020204" pitchFamily="34" charset="0"/>
@@ -7896,7 +8008,7 @@
               <a:t> one.  This is what is known as a </a:t>
             </a:r>
             <a:r>
-              <a:rPr lang="en-US" sz="2200" b="1" kern="100" dirty="0">
+              <a:rPr lang="en-US" sz="2400" b="1" kern="100" dirty="0">
                 <a:effectLst/>
                 <a:latin typeface="Aptos" panose="020B0004020202020204" pitchFamily="34" charset="0"/>
                 <a:ea typeface="Aptos" panose="020B0004020202020204" pitchFamily="34" charset="0"/>
@@ -7905,7 +8017,7 @@
               <a:t>constraint satisfaction problem</a:t>
             </a:r>
             <a:r>
-              <a:rPr lang="en-US" sz="2200" kern="100" dirty="0">
+              <a:rPr lang="en-US" sz="2400" kern="100" dirty="0">
                 <a:effectLst/>
                 <a:latin typeface="Aptos" panose="020B0004020202020204" pitchFamily="34" charset="0"/>
                 <a:ea typeface="Aptos" panose="020B0004020202020204" pitchFamily="34" charset="0"/>
@@ -7916,17 +8028,47 @@
           </a:p>
           <a:p>
             <a:r>
-              <a:rPr lang="en-US" sz="2200" kern="100" dirty="0">
+              <a:rPr lang="en-US" sz="2400" kern="100" dirty="0">
                 <a:effectLst/>
                 <a:latin typeface="Aptos" panose="020B0004020202020204" pitchFamily="34" charset="0"/>
                 <a:ea typeface="Aptos" panose="020B0004020202020204" pitchFamily="34" charset="0"/>
                 <a:cs typeface="Times New Roman" panose="02020603050405020304" pitchFamily="18" charset="0"/>
               </a:rPr>
-              <a:t>We can add optimality conditions by considering several factors. Some notation:</a:t>
-            </a:r>
-          </a:p>
-          <a:p>
-            <a:endParaRPr lang="en-US" sz="2000" kern="100" dirty="0">
+              <a:t>We can add optimality conditions by considering </a:t>
+            </a:r>
+            <a:r>
+              <a:rPr lang="en-US" sz="2400" kern="100">
+                <a:effectLst/>
+                <a:latin typeface="Aptos" panose="020B0004020202020204" pitchFamily="34" charset="0"/>
+                <a:ea typeface="Aptos" panose="020B0004020202020204" pitchFamily="34" charset="0"/>
+                <a:cs typeface="Times New Roman" panose="02020603050405020304" pitchFamily="18" charset="0"/>
+              </a:rPr>
+              <a:t>several factors. Below </a:t>
+            </a:r>
+            <a:r>
+              <a:rPr lang="en-US" sz="2400" kern="100" dirty="0">
+                <a:effectLst/>
+                <a:latin typeface="Aptos" panose="020B0004020202020204" pitchFamily="34" charset="0"/>
+                <a:ea typeface="Aptos" panose="020B0004020202020204" pitchFamily="34" charset="0"/>
+                <a:cs typeface="Times New Roman" panose="02020603050405020304" pitchFamily="18" charset="0"/>
+              </a:rPr>
+              <a:t>are a few objective functions to </a:t>
+            </a:r>
+            <a:r>
+              <a:rPr lang="en-US" sz="2400" kern="100">
+                <a:effectLst/>
+                <a:latin typeface="Aptos" panose="020B0004020202020204" pitchFamily="34" charset="0"/>
+                <a:ea typeface="Aptos" panose="020B0004020202020204" pitchFamily="34" charset="0"/>
+                <a:cs typeface="Times New Roman" panose="02020603050405020304" pitchFamily="18" charset="0"/>
+              </a:rPr>
+              <a:t>consider:</a:t>
+            </a:r>
+          </a:p>
+          <a:p>
+            <a:pPr marL="0" indent="0">
+              <a:buNone/>
+            </a:pPr>
+            <a:endParaRPr lang="en-US" sz="1400" kern="100" dirty="0">
               <a:effectLst/>
               <a:latin typeface="Aptos" panose="020B0004020202020204" pitchFamily="34" charset="0"/>
               <a:ea typeface="Aptos" panose="020B0004020202020204" pitchFamily="34" charset="0"/>
@@ -7934,27 +8076,112 @@
             </a:endParaRPr>
           </a:p>
           <a:p>
+            <a:pPr marL="514350" lvl="0" indent="-514350">
+              <a:buFont typeface="+mj-lt"/>
+              <a:buAutoNum type="arabicPeriod"/>
+            </a:pPr>
+            <a:r>
+              <a:rPr lang="en-US" sz="2600" b="1"/>
+              <a:t>Min–max rank (regret minimization).</a:t>
+            </a:r>
+            <a:br>
+              <a:rPr lang="en-US" sz="2600"/>
+            </a:br>
+            <a:r>
+              <a:rPr lang="en-US" sz="2600"/>
+              <a:t>Find a stable matching that minimizes the </a:t>
+            </a:r>
+            <a:r>
+              <a:rPr lang="en-US" sz="2600" i="1"/>
+              <a:t>maximum rank assigned to any participant</a:t>
+            </a:r>
+            <a:r>
+              <a:rPr lang="en-US" sz="2600"/>
+              <a:t>.</a:t>
+            </a:r>
+          </a:p>
+          <a:p>
+            <a:pPr lvl="1"/>
+            <a:r>
+              <a:rPr lang="en-US" sz="2200"/>
+              <a:t>That is, for the participant who is worst off (receives their least-preferred feasible partner), make that rank as small as possible.</a:t>
+            </a:r>
+          </a:p>
+          <a:p>
+            <a:pPr lvl="1"/>
+            <a:endParaRPr lang="en-US" sz="1300"/>
+          </a:p>
+          <a:p>
             <a:pPr marL="0" indent="0">
               <a:buNone/>
             </a:pPr>
-            <a:endParaRPr lang="en-US" dirty="0"/>
+            <a:r>
+              <a:rPr lang="en-US" sz="2600"/>
+              <a:t>If numerical costs (or ranks) can be associated with each match – </a:t>
+            </a:r>
           </a:p>
           <a:p>
             <a:pPr marL="0" indent="0">
               <a:buNone/>
             </a:pPr>
-            <a:r>
-              <a:rPr lang="en-US" sz="2400" kern="100" dirty="0">
-                <a:effectLst/>
-                <a:latin typeface="Aptos" panose="020B0004020202020204" pitchFamily="34" charset="0"/>
-                <a:ea typeface="Aptos" panose="020B0004020202020204" pitchFamily="34" charset="0"/>
-                <a:cs typeface="Times New Roman" panose="02020603050405020304" pitchFamily="18" charset="0"/>
-              </a:rPr>
-              <a:t>Below are a few objective functions to consider:</a:t>
-            </a:r>
-          </a:p>
-          <a:p>
-            <a:endParaRPr lang="en-US" sz="2400" b="1" dirty="0"/>
+            <a:endParaRPr lang="en-US" sz="1300"/>
+          </a:p>
+          <a:p>
+            <a:pPr marL="514350" lvl="0" indent="-514350">
+              <a:buFont typeface="+mj-lt"/>
+              <a:buAutoNum type="arabicPeriod" startAt="2"/>
+            </a:pPr>
+            <a:r>
+              <a:rPr lang="en-US" sz="2600" b="1"/>
+              <a:t>Minimum total cost (egalitarian stable matching).</a:t>
+            </a:r>
+            <a:br>
+              <a:rPr lang="en-US" sz="2600"/>
+            </a:br>
+            <a:r>
+              <a:rPr lang="en-US" sz="2600"/>
+              <a:t>Find a stable matching that minimizes the </a:t>
+            </a:r>
+            <a:r>
+              <a:rPr lang="en-US" sz="2600" i="1"/>
+              <a:t>total cost across all participants</a:t>
+            </a:r>
+            <a:r>
+              <a:rPr lang="en-US" sz="2600"/>
+              <a:t>.</a:t>
+            </a:r>
+          </a:p>
+          <a:p>
+            <a:pPr marL="514350" lvl="0" indent="-514350">
+              <a:buFont typeface="+mj-lt"/>
+              <a:buAutoNum type="arabicPeriod" startAt="2"/>
+            </a:pPr>
+            <a:r>
+              <a:rPr lang="en-US" sz="2600" b="1"/>
+              <a:t>Minimum cost difference (sex-equal stable matching).</a:t>
+            </a:r>
+            <a:br>
+              <a:rPr lang="en-US" sz="2600"/>
+            </a:br>
+            <a:r>
+              <a:rPr lang="en-US" sz="2600"/>
+              <a:t>Consider total cost separately for each side (e.g., men and women).</a:t>
+            </a:r>
+            <a:br>
+              <a:rPr lang="en-US" sz="2600"/>
+            </a:br>
+            <a:r>
+              <a:rPr lang="en-US" sz="2600"/>
+              <a:t>Find a stable matching that minimizes the </a:t>
+            </a:r>
+            <a:r>
+              <a:rPr lang="en-US" sz="2600" i="1"/>
+              <a:t>absolute difference</a:t>
+            </a:r>
+            <a:r>
+              <a:rPr lang="en-US" sz="2600"/>
+              <a:t> between the total cost of the two sides.</a:t>
+            </a:r>
           </a:p>
         </p:txBody>
       </p:sp>
@@ -8165,152 +8392,6 @@
           </a:p>
         </p:txBody>
       </p:sp>
-      <p:pic>
-        <p:nvPicPr>
-          <p:cNvPr id="7" name="Picture 6">
-            <a:extLst>
-              <a:ext uri="{FF2B5EF4-FFF2-40B4-BE49-F238E27FC236}">
-                <a16:creationId xmlns:a16="http://schemas.microsoft.com/office/drawing/2014/main" id="{74B2F2F7-DCFD-C212-7ABA-C7BCCE0F9C1A}"/>
-              </a:ext>
-            </a:extLst>
-          </p:cNvPr>
-          <p:cNvPicPr>
-            <a:picLocks noChangeAspect="1"/>
-          </p:cNvPicPr>
-          <p:nvPr/>
-        </p:nvPicPr>
-        <p:blipFill>
-          <a:blip r:embed="rId3"/>
-          <a:stretch>
-            <a:fillRect/>
-          </a:stretch>
-        </p:blipFill>
-        <p:spPr>
-          <a:xfrm>
-            <a:off x="399092" y="4605336"/>
-            <a:ext cx="9306884" cy="460281"/>
-          </a:xfrm>
-          <a:prstGeom prst="rect">
-            <a:avLst/>
-          </a:prstGeom>
-        </p:spPr>
-      </p:pic>
-      <p:pic>
-        <p:nvPicPr>
-          <p:cNvPr id="8" name="Picture 7">
-            <a:extLst>
-              <a:ext uri="{FF2B5EF4-FFF2-40B4-BE49-F238E27FC236}">
-                <a16:creationId xmlns:a16="http://schemas.microsoft.com/office/drawing/2014/main" id="{A9799CC2-DEB5-B8EC-10ED-5140E61B7381}"/>
-              </a:ext>
-            </a:extLst>
-          </p:cNvPr>
-          <p:cNvPicPr>
-            <a:picLocks noChangeAspect="1"/>
-          </p:cNvPicPr>
-          <p:nvPr/>
-        </p:nvPicPr>
-        <p:blipFill>
-          <a:blip r:embed="rId4"/>
-          <a:srcRect l="61583" t="3439" b="48806"/>
-          <a:stretch/>
-        </p:blipFill>
-        <p:spPr>
-          <a:xfrm>
-            <a:off x="741710" y="5121175"/>
-            <a:ext cx="4018375" cy="304800"/>
-          </a:xfrm>
-          <a:prstGeom prst="rect">
-            <a:avLst/>
-          </a:prstGeom>
-        </p:spPr>
-      </p:pic>
-      <p:pic>
-        <p:nvPicPr>
-          <p:cNvPr id="9" name="Picture 8">
-            <a:extLst>
-              <a:ext uri="{FF2B5EF4-FFF2-40B4-BE49-F238E27FC236}">
-                <a16:creationId xmlns:a16="http://schemas.microsoft.com/office/drawing/2014/main" id="{AA7EEEE5-B7F2-43EE-B597-AFD39A647AE2}"/>
-              </a:ext>
-            </a:extLst>
-          </p:cNvPr>
-          <p:cNvPicPr>
-            <a:picLocks noChangeAspect="1"/>
-          </p:cNvPicPr>
-          <p:nvPr/>
-        </p:nvPicPr>
-        <p:blipFill>
-          <a:blip r:embed="rId4"/>
-          <a:srcRect t="52245"/>
-          <a:stretch/>
-        </p:blipFill>
-        <p:spPr>
-          <a:xfrm>
-            <a:off x="741710" y="5465498"/>
-            <a:ext cx="10459910" cy="304800"/>
-          </a:xfrm>
-          <a:prstGeom prst="rect">
-            <a:avLst/>
-          </a:prstGeom>
-        </p:spPr>
-      </p:pic>
-      <p:pic>
-        <p:nvPicPr>
-          <p:cNvPr id="10" name="Picture 9" descr="A close-up of a text&#10;&#10;Description automatically generated">
-            <a:extLst>
-              <a:ext uri="{FF2B5EF4-FFF2-40B4-BE49-F238E27FC236}">
-                <a16:creationId xmlns:a16="http://schemas.microsoft.com/office/drawing/2014/main" id="{D3CA439B-7171-6CA9-C6D9-4AA531B42645}"/>
-              </a:ext>
-            </a:extLst>
-          </p:cNvPr>
-          <p:cNvPicPr>
-            <a:picLocks noChangeAspect="1"/>
-          </p:cNvPicPr>
-          <p:nvPr/>
-        </p:nvPicPr>
-        <p:blipFill>
-          <a:blip r:embed="rId5"/>
-          <a:srcRect t="1" b="65520"/>
-          <a:stretch/>
-        </p:blipFill>
-        <p:spPr>
-          <a:xfrm>
-            <a:off x="399090" y="3726796"/>
-            <a:ext cx="10560251" cy="987714"/>
-          </a:xfrm>
-          <a:prstGeom prst="rect">
-            <a:avLst/>
-          </a:prstGeom>
-        </p:spPr>
-      </p:pic>
-      <p:pic>
-        <p:nvPicPr>
-          <p:cNvPr id="11" name="Picture 10" descr="A close-up of a text&#10;&#10;Description automatically generated">
-            <a:extLst>
-              <a:ext uri="{FF2B5EF4-FFF2-40B4-BE49-F238E27FC236}">
-                <a16:creationId xmlns:a16="http://schemas.microsoft.com/office/drawing/2014/main" id="{42D8EB23-FB1E-4D6F-12AB-8D4C1656F900}"/>
-              </a:ext>
-            </a:extLst>
-          </p:cNvPr>
-          <p:cNvPicPr>
-            <a:picLocks noChangeAspect="1"/>
-          </p:cNvPicPr>
-          <p:nvPr/>
-        </p:nvPicPr>
-        <p:blipFill>
-          <a:blip r:embed="rId5"/>
-          <a:srcRect t="70838"/>
-          <a:stretch/>
-        </p:blipFill>
-        <p:spPr>
-          <a:xfrm>
-            <a:off x="399089" y="5737733"/>
-            <a:ext cx="10404797" cy="823075"/>
-          </a:xfrm>
-          <a:prstGeom prst="rect">
-            <a:avLst/>
-          </a:prstGeom>
-        </p:spPr>
-      </p:pic>
       <p:cxnSp>
         <p:nvCxnSpPr>
           <p:cNvPr id="12" name="Straight Connector 11">
@@ -8354,22 +8435,941 @@
           </a:fontRef>
         </p:style>
       </p:cxnSp>
+    </p:spTree>
+    <p:extLst>
+      <p:ext uri="{BB962C8B-B14F-4D97-AF65-F5344CB8AC3E}">
+        <p14:creationId xmlns:p14="http://schemas.microsoft.com/office/powerpoint/2010/main" val="2326768796"/>
+      </p:ext>
+    </p:extLst>
+  </p:cSld>
+  <p:clrMapOvr>
+    <a:masterClrMapping/>
+  </p:clrMapOvr>
+  <p:timing>
+    <p:tnLst>
+      <p:par>
+        <p:cTn id="1" dur="indefinite" restart="never" nodeType="tmRoot">
+          <p:childTnLst>
+            <p:seq concurrent="1" nextAc="seek">
+              <p:cTn id="2" dur="indefinite" nodeType="mainSeq">
+                <p:childTnLst>
+                  <p:par>
+                    <p:cTn id="3" fill="hold">
+                      <p:stCondLst>
+                        <p:cond delay="indefinite"/>
+                      </p:stCondLst>
+                      <p:childTnLst>
+                        <p:par>
+                          <p:cTn id="4" fill="hold">
+                            <p:stCondLst>
+                              <p:cond delay="0"/>
+                            </p:stCondLst>
+                            <p:childTnLst>
+                              <p:par>
+                                <p:cTn id="5" presetID="1" presetClass="entr" presetSubtype="0" fill="hold" nodeType="clickEffect">
+                                  <p:stCondLst>
+                                    <p:cond delay="0"/>
+                                  </p:stCondLst>
+                                  <p:childTnLst>
+                                    <p:set>
+                                      <p:cBhvr>
+                                        <p:cTn id="6" dur="1" fill="hold">
+                                          <p:stCondLst>
+                                            <p:cond delay="0"/>
+                                          </p:stCondLst>
+                                        </p:cTn>
+                                        <p:tgtEl>
+                                          <p:spTgt spid="3">
+                                            <p:txEl>
+                                              <p:pRg st="0" end="0"/>
+                                            </p:txEl>
+                                          </p:spTgt>
+                                        </p:tgtEl>
+                                        <p:attrNameLst>
+                                          <p:attrName>style.visibility</p:attrName>
+                                        </p:attrNameLst>
+                                      </p:cBhvr>
+                                      <p:to>
+                                        <p:strVal val="visible"/>
+                                      </p:to>
+                                    </p:set>
+                                  </p:childTnLst>
+                                </p:cTn>
+                              </p:par>
+                              <p:par>
+                                <p:cTn id="7" presetID="1" presetClass="entr" presetSubtype="0" fill="hold" nodeType="withEffect">
+                                  <p:stCondLst>
+                                    <p:cond delay="0"/>
+                                  </p:stCondLst>
+                                  <p:childTnLst>
+                                    <p:set>
+                                      <p:cBhvr>
+                                        <p:cTn id="8" dur="1" fill="hold">
+                                          <p:stCondLst>
+                                            <p:cond delay="0"/>
+                                          </p:stCondLst>
+                                        </p:cTn>
+                                        <p:tgtEl>
+                                          <p:spTgt spid="3">
+                                            <p:txEl>
+                                              <p:pRg st="1" end="1"/>
+                                            </p:txEl>
+                                          </p:spTgt>
+                                        </p:tgtEl>
+                                        <p:attrNameLst>
+                                          <p:attrName>style.visibility</p:attrName>
+                                        </p:attrNameLst>
+                                      </p:cBhvr>
+                                      <p:to>
+                                        <p:strVal val="visible"/>
+                                      </p:to>
+                                    </p:set>
+                                  </p:childTnLst>
+                                </p:cTn>
+                              </p:par>
+                            </p:childTnLst>
+                          </p:cTn>
+                        </p:par>
+                      </p:childTnLst>
+                    </p:cTn>
+                  </p:par>
+                  <p:par>
+                    <p:cTn id="9" fill="hold">
+                      <p:stCondLst>
+                        <p:cond delay="indefinite"/>
+                      </p:stCondLst>
+                      <p:childTnLst>
+                        <p:par>
+                          <p:cTn id="10" fill="hold">
+                            <p:stCondLst>
+                              <p:cond delay="0"/>
+                            </p:stCondLst>
+                            <p:childTnLst>
+                              <p:par>
+                                <p:cTn id="11" presetID="1" presetClass="entr" presetSubtype="0" fill="hold" nodeType="clickEffect">
+                                  <p:stCondLst>
+                                    <p:cond delay="0"/>
+                                  </p:stCondLst>
+                                  <p:childTnLst>
+                                    <p:set>
+                                      <p:cBhvr>
+                                        <p:cTn id="12" dur="1" fill="hold">
+                                          <p:stCondLst>
+                                            <p:cond delay="0"/>
+                                          </p:stCondLst>
+                                        </p:cTn>
+                                        <p:tgtEl>
+                                          <p:spTgt spid="3">
+                                            <p:txEl>
+                                              <p:pRg st="3" end="3"/>
+                                            </p:txEl>
+                                          </p:spTgt>
+                                        </p:tgtEl>
+                                        <p:attrNameLst>
+                                          <p:attrName>style.visibility</p:attrName>
+                                        </p:attrNameLst>
+                                      </p:cBhvr>
+                                      <p:to>
+                                        <p:strVal val="visible"/>
+                                      </p:to>
+                                    </p:set>
+                                  </p:childTnLst>
+                                </p:cTn>
+                              </p:par>
+                            </p:childTnLst>
+                          </p:cTn>
+                        </p:par>
+                      </p:childTnLst>
+                    </p:cTn>
+                  </p:par>
+                  <p:par>
+                    <p:cTn id="13" fill="hold">
+                      <p:stCondLst>
+                        <p:cond delay="indefinite"/>
+                      </p:stCondLst>
+                      <p:childTnLst>
+                        <p:par>
+                          <p:cTn id="14" fill="hold">
+                            <p:stCondLst>
+                              <p:cond delay="0"/>
+                            </p:stCondLst>
+                            <p:childTnLst>
+                              <p:par>
+                                <p:cTn id="15" presetID="1" presetClass="entr" presetSubtype="0" fill="hold" nodeType="clickEffect">
+                                  <p:stCondLst>
+                                    <p:cond delay="0"/>
+                                  </p:stCondLst>
+                                  <p:childTnLst>
+                                    <p:set>
+                                      <p:cBhvr>
+                                        <p:cTn id="16" dur="1" fill="hold">
+                                          <p:stCondLst>
+                                            <p:cond delay="0"/>
+                                          </p:stCondLst>
+                                        </p:cTn>
+                                        <p:tgtEl>
+                                          <p:spTgt spid="3">
+                                            <p:txEl>
+                                              <p:pRg st="4" end="4"/>
+                                            </p:txEl>
+                                          </p:spTgt>
+                                        </p:tgtEl>
+                                        <p:attrNameLst>
+                                          <p:attrName>style.visibility</p:attrName>
+                                        </p:attrNameLst>
+                                      </p:cBhvr>
+                                      <p:to>
+                                        <p:strVal val="visible"/>
+                                      </p:to>
+                                    </p:set>
+                                  </p:childTnLst>
+                                </p:cTn>
+                              </p:par>
+                            </p:childTnLst>
+                          </p:cTn>
+                        </p:par>
+                      </p:childTnLst>
+                    </p:cTn>
+                  </p:par>
+                  <p:par>
+                    <p:cTn id="17" fill="hold">
+                      <p:stCondLst>
+                        <p:cond delay="indefinite"/>
+                      </p:stCondLst>
+                      <p:childTnLst>
+                        <p:par>
+                          <p:cTn id="18" fill="hold">
+                            <p:stCondLst>
+                              <p:cond delay="0"/>
+                            </p:stCondLst>
+                            <p:childTnLst>
+                              <p:par>
+                                <p:cTn id="19" presetID="1" presetClass="entr" presetSubtype="0" fill="hold" nodeType="clickEffect">
+                                  <p:stCondLst>
+                                    <p:cond delay="0"/>
+                                  </p:stCondLst>
+                                  <p:childTnLst>
+                                    <p:set>
+                                      <p:cBhvr>
+                                        <p:cTn id="20" dur="1" fill="hold">
+                                          <p:stCondLst>
+                                            <p:cond delay="0"/>
+                                          </p:stCondLst>
+                                        </p:cTn>
+                                        <p:tgtEl>
+                                          <p:spTgt spid="3">
+                                            <p:txEl>
+                                              <p:pRg st="6" end="6"/>
+                                            </p:txEl>
+                                          </p:spTgt>
+                                        </p:tgtEl>
+                                        <p:attrNameLst>
+                                          <p:attrName>style.visibility</p:attrName>
+                                        </p:attrNameLst>
+                                      </p:cBhvr>
+                                      <p:to>
+                                        <p:strVal val="visible"/>
+                                      </p:to>
+                                    </p:set>
+                                  </p:childTnLst>
+                                </p:cTn>
+                              </p:par>
+                            </p:childTnLst>
+                          </p:cTn>
+                        </p:par>
+                      </p:childTnLst>
+                    </p:cTn>
+                  </p:par>
+                  <p:par>
+                    <p:cTn id="21" fill="hold">
+                      <p:stCondLst>
+                        <p:cond delay="indefinite"/>
+                      </p:stCondLst>
+                      <p:childTnLst>
+                        <p:par>
+                          <p:cTn id="22" fill="hold">
+                            <p:stCondLst>
+                              <p:cond delay="0"/>
+                            </p:stCondLst>
+                            <p:childTnLst>
+                              <p:par>
+                                <p:cTn id="23" presetID="1" presetClass="entr" presetSubtype="0" fill="hold" nodeType="clickEffect">
+                                  <p:stCondLst>
+                                    <p:cond delay="0"/>
+                                  </p:stCondLst>
+                                  <p:childTnLst>
+                                    <p:set>
+                                      <p:cBhvr>
+                                        <p:cTn id="24" dur="1" fill="hold">
+                                          <p:stCondLst>
+                                            <p:cond delay="0"/>
+                                          </p:stCondLst>
+                                        </p:cTn>
+                                        <p:tgtEl>
+                                          <p:spTgt spid="3">
+                                            <p:txEl>
+                                              <p:pRg st="8" end="8"/>
+                                            </p:txEl>
+                                          </p:spTgt>
+                                        </p:tgtEl>
+                                        <p:attrNameLst>
+                                          <p:attrName>style.visibility</p:attrName>
+                                        </p:attrNameLst>
+                                      </p:cBhvr>
+                                      <p:to>
+                                        <p:strVal val="visible"/>
+                                      </p:to>
+                                    </p:set>
+                                  </p:childTnLst>
+                                </p:cTn>
+                              </p:par>
+                            </p:childTnLst>
+                          </p:cTn>
+                        </p:par>
+                      </p:childTnLst>
+                    </p:cTn>
+                  </p:par>
+                  <p:par>
+                    <p:cTn id="25" fill="hold">
+                      <p:stCondLst>
+                        <p:cond delay="indefinite"/>
+                      </p:stCondLst>
+                      <p:childTnLst>
+                        <p:par>
+                          <p:cTn id="26" fill="hold">
+                            <p:stCondLst>
+                              <p:cond delay="0"/>
+                            </p:stCondLst>
+                            <p:childTnLst>
+                              <p:par>
+                                <p:cTn id="27" presetID="1" presetClass="entr" presetSubtype="0" fill="hold" nodeType="clickEffect">
+                                  <p:stCondLst>
+                                    <p:cond delay="0"/>
+                                  </p:stCondLst>
+                                  <p:childTnLst>
+                                    <p:set>
+                                      <p:cBhvr>
+                                        <p:cTn id="28" dur="1" fill="hold">
+                                          <p:stCondLst>
+                                            <p:cond delay="0"/>
+                                          </p:stCondLst>
+                                        </p:cTn>
+                                        <p:tgtEl>
+                                          <p:spTgt spid="3">
+                                            <p:txEl>
+                                              <p:pRg st="9" end="9"/>
+                                            </p:txEl>
+                                          </p:spTgt>
+                                        </p:tgtEl>
+                                        <p:attrNameLst>
+                                          <p:attrName>style.visibility</p:attrName>
+                                        </p:attrNameLst>
+                                      </p:cBhvr>
+                                      <p:to>
+                                        <p:strVal val="visible"/>
+                                      </p:to>
+                                    </p:set>
+                                  </p:childTnLst>
+                                </p:cTn>
+                              </p:par>
+                              <p:par>
+                                <p:cTn id="29" presetID="1" presetClass="entr" presetSubtype="0" fill="hold" nodeType="withEffect">
+                                  <p:stCondLst>
+                                    <p:cond delay="0"/>
+                                  </p:stCondLst>
+                                  <p:childTnLst>
+                                    <p:set>
+                                      <p:cBhvr>
+                                        <p:cTn id="30" dur="1" fill="hold">
+                                          <p:stCondLst>
+                                            <p:cond delay="0"/>
+                                          </p:stCondLst>
+                                        </p:cTn>
+                                        <p:tgtEl>
+                                          <p:spTgt spid="12"/>
+                                        </p:tgtEl>
+                                        <p:attrNameLst>
+                                          <p:attrName>style.visibility</p:attrName>
+                                        </p:attrNameLst>
+                                      </p:cBhvr>
+                                      <p:to>
+                                        <p:strVal val="visible"/>
+                                      </p:to>
+                                    </p:set>
+                                  </p:childTnLst>
+                                </p:cTn>
+                              </p:par>
+                            </p:childTnLst>
+                          </p:cTn>
+                        </p:par>
+                      </p:childTnLst>
+                    </p:cTn>
+                  </p:par>
+                </p:childTnLst>
+              </p:cTn>
+              <p:prevCondLst>
+                <p:cond evt="onPrev" delay="0">
+                  <p:tgtEl>
+                    <p:sldTgt/>
+                  </p:tgtEl>
+                </p:cond>
+              </p:prevCondLst>
+              <p:nextCondLst>
+                <p:cond evt="onNext" delay="0">
+                  <p:tgtEl>
+                    <p:sldTgt/>
+                  </p:tgtEl>
+                </p:cond>
+              </p:nextCondLst>
+            </p:seq>
+          </p:childTnLst>
+        </p:cTn>
+      </p:par>
+    </p:tnLst>
+  </p:timing>
+</p:sld>
+</file>
+
+<file path=ppt/slides/slide5.xml><?xml version="1.0" encoding="utf-8"?>
+<p:sld xmlns:a="http://schemas.openxmlformats.org/drawingml/2006/main" xmlns:r="http://schemas.openxmlformats.org/officeDocument/2006/relationships" xmlns:p="http://schemas.openxmlformats.org/presentationml/2006/main">
+  <p:cSld>
+    <p:spTree>
+      <p:nvGrpSpPr>
+        <p:cNvPr id="1" name="">
+          <a:extLst>
+            <a:ext uri="{FF2B5EF4-FFF2-40B4-BE49-F238E27FC236}">
+              <a16:creationId xmlns:a16="http://schemas.microsoft.com/office/drawing/2014/main" id="{D924F915-4DA9-EAC0-137B-2858CA3F2249}"/>
+            </a:ext>
+          </a:extLst>
+        </p:cNvPr>
+        <p:cNvGrpSpPr/>
+        <p:nvPr/>
+      </p:nvGrpSpPr>
+      <p:grpSpPr>
+        <a:xfrm>
+          <a:off x="0" y="0"/>
+          <a:ext cx="0" cy="0"/>
+          <a:chOff x="0" y="0"/>
+          <a:chExt cx="0" cy="0"/>
+        </a:xfrm>
+      </p:grpSpPr>
+      <p:sp>
+        <p:nvSpPr>
+          <p:cNvPr id="2" name="Title 1">
+            <a:extLst>
+              <a:ext uri="{FF2B5EF4-FFF2-40B4-BE49-F238E27FC236}">
+                <a16:creationId xmlns:a16="http://schemas.microsoft.com/office/drawing/2014/main" id="{90F6FB91-E499-365B-0EE7-EB63FA8DA419}"/>
+              </a:ext>
+            </a:extLst>
+          </p:cNvPr>
+          <p:cNvSpPr>
+            <a:spLocks noGrp="1"/>
+          </p:cNvSpPr>
+          <p:nvPr>
+            <p:ph type="title"/>
+          </p:nvPr>
+        </p:nvSpPr>
+        <p:spPr>
+          <a:xfrm>
+            <a:off x="407443" y="231486"/>
+            <a:ext cx="11128443" cy="1325563"/>
+          </a:xfrm>
+        </p:spPr>
+        <p:txBody>
+          <a:bodyPr>
+            <a:normAutofit/>
+          </a:bodyPr>
+          <a:lstStyle/>
+          <a:p>
+            <a:r>
+              <a:rPr lang="en-US" sz="3600"/>
+              <a:t>Mathematical Formulation of SMP </a:t>
+            </a:r>
+            <a:r>
+              <a:rPr lang="en-US" sz="3600" dirty="0"/>
+              <a:t>IP </a:t>
+            </a:r>
+            <a:r>
+              <a:rPr lang="en-US" sz="3600"/>
+              <a:t>Objective Functions</a:t>
+            </a:r>
+            <a:endParaRPr lang="en-US" sz="3600" dirty="0"/>
+          </a:p>
+        </p:txBody>
+      </p:sp>
+      <p:sp>
+        <p:nvSpPr>
+          <p:cNvPr id="3" name="Content Placeholder 2">
+            <a:extLst>
+              <a:ext uri="{FF2B5EF4-FFF2-40B4-BE49-F238E27FC236}">
+                <a16:creationId xmlns:a16="http://schemas.microsoft.com/office/drawing/2014/main" id="{7C6F0586-B6E6-495A-6209-75280A0C99AC}"/>
+              </a:ext>
+            </a:extLst>
+          </p:cNvPr>
+          <p:cNvSpPr>
+            <a:spLocks noGrp="1"/>
+          </p:cNvSpPr>
+          <p:nvPr>
+            <p:ph idx="1"/>
+          </p:nvPr>
+        </p:nvSpPr>
+        <p:spPr>
+          <a:xfrm>
+            <a:off x="399088" y="1671738"/>
+            <a:ext cx="11311841" cy="3997735"/>
+          </a:xfrm>
+        </p:spPr>
+        <p:txBody>
+          <a:bodyPr/>
+          <a:lstStyle/>
+          <a:p>
+            <a:r>
+              <a:rPr lang="en-US" sz="2200" kern="100">
+                <a:effectLst/>
+                <a:latin typeface="Aptos" panose="020B0004020202020204" pitchFamily="34" charset="0"/>
+                <a:ea typeface="Aptos" panose="020B0004020202020204" pitchFamily="34" charset="0"/>
+                <a:cs typeface="Times New Roman" panose="02020603050405020304" pitchFamily="18" charset="0"/>
+              </a:rPr>
+              <a:t>Some </a:t>
+            </a:r>
+            <a:r>
+              <a:rPr lang="en-US" sz="2200" kern="100" dirty="0">
+                <a:effectLst/>
+                <a:latin typeface="Aptos" panose="020B0004020202020204" pitchFamily="34" charset="0"/>
+                <a:ea typeface="Aptos" panose="020B0004020202020204" pitchFamily="34" charset="0"/>
+                <a:cs typeface="Times New Roman" panose="02020603050405020304" pitchFamily="18" charset="0"/>
+              </a:rPr>
+              <a:t>notation:</a:t>
+            </a:r>
+          </a:p>
+          <a:p>
+            <a:endParaRPr lang="en-US" sz="2000" kern="100" dirty="0">
+              <a:effectLst/>
+              <a:latin typeface="Aptos" panose="020B0004020202020204" pitchFamily="34" charset="0"/>
+              <a:ea typeface="Aptos" panose="020B0004020202020204" pitchFamily="34" charset="0"/>
+              <a:cs typeface="Times New Roman" panose="02020603050405020304" pitchFamily="18" charset="0"/>
+            </a:endParaRPr>
+          </a:p>
+          <a:p>
+            <a:pPr marL="0" indent="0">
+              <a:buNone/>
+            </a:pPr>
+            <a:endParaRPr lang="en-US" dirty="0"/>
+          </a:p>
+          <a:p>
+            <a:pPr marL="0" indent="0">
+              <a:buNone/>
+            </a:pPr>
+            <a:r>
+              <a:rPr lang="en-US" sz="2400" kern="100">
+                <a:effectLst/>
+                <a:latin typeface="Aptos" panose="020B0004020202020204" pitchFamily="34" charset="0"/>
+                <a:ea typeface="Aptos" panose="020B0004020202020204" pitchFamily="34" charset="0"/>
+                <a:cs typeface="Times New Roman" panose="02020603050405020304" pitchFamily="18" charset="0"/>
+              </a:rPr>
+              <a:t>Objective functions from previous slide expressed more mathematically:</a:t>
+            </a:r>
+            <a:endParaRPr lang="en-US" sz="2400" kern="100" dirty="0">
+              <a:effectLst/>
+              <a:latin typeface="Aptos" panose="020B0004020202020204" pitchFamily="34" charset="0"/>
+              <a:ea typeface="Aptos" panose="020B0004020202020204" pitchFamily="34" charset="0"/>
+              <a:cs typeface="Times New Roman" panose="02020603050405020304" pitchFamily="18" charset="0"/>
+            </a:endParaRPr>
+          </a:p>
+          <a:p>
+            <a:endParaRPr lang="en-US" sz="2400" b="1" dirty="0"/>
+          </a:p>
+        </p:txBody>
+      </p:sp>
+      <p:sp>
+        <p:nvSpPr>
+          <p:cNvPr id="4" name="Rectangle 4">
+            <a:extLst>
+              <a:ext uri="{FF2B5EF4-FFF2-40B4-BE49-F238E27FC236}">
+                <a16:creationId xmlns:a16="http://schemas.microsoft.com/office/drawing/2014/main" id="{886A36C7-ED20-0568-8F9A-95D497A55927}"/>
+              </a:ext>
+            </a:extLst>
+          </p:cNvPr>
+          <p:cNvSpPr>
+            <a:spLocks noChangeArrowheads="1"/>
+          </p:cNvSpPr>
+          <p:nvPr/>
+        </p:nvSpPr>
+        <p:spPr bwMode="auto">
+          <a:xfrm>
+            <a:off x="838200" y="3652737"/>
+            <a:ext cx="12192000" cy="457200"/>
+          </a:xfrm>
+          <a:prstGeom prst="rect">
+            <a:avLst/>
+          </a:prstGeom>
+          <a:noFill/>
+          <a:ln>
+            <a:noFill/>
+          </a:ln>
+          <a:effectLst/>
+          <a:extLst>
+            <a:ext uri="{909E8E84-426E-40DD-AFC4-6F175D3DCCD1}">
+              <a14:hiddenFill xmlns:a14="http://schemas.microsoft.com/office/drawing/2010/main">
+                <a:solidFill>
+                  <a:schemeClr val="accent1"/>
+                </a:solidFill>
+              </a14:hiddenFill>
+            </a:ext>
+            <a:ext uri="{91240B29-F687-4F45-9708-019B960494DF}">
+              <a14:hiddenLine xmlns:a14="http://schemas.microsoft.com/office/drawing/2010/main" w="9525">
+                <a:solidFill>
+                  <a:schemeClr val="tx1"/>
+                </a:solidFill>
+                <a:miter lim="800000"/>
+                <a:headEnd/>
+                <a:tailEnd/>
+              </a14:hiddenLine>
+            </a:ext>
+            <a:ext uri="{AF507438-7753-43E0-B8FC-AC1667EBCBE1}">
+              <a14:hiddenEffects xmlns:a14="http://schemas.microsoft.com/office/drawing/2010/main">
+                <a:effectLst>
+                  <a:outerShdw dist="35921" dir="2700000" algn="ctr" rotWithShape="0">
+                    <a:schemeClr val="bg2"/>
+                  </a:outerShdw>
+                </a:effectLst>
+              </a14:hiddenEffects>
+            </a:ext>
+          </a:extLst>
+        </p:spPr>
+        <p:txBody>
+          <a:bodyPr vert="horz" wrap="none" lIns="91440" tIns="45720" rIns="91440" bIns="45720" numCol="1" anchor="ctr" anchorCtr="0" compatLnSpc="1">
+            <a:prstTxWarp prst="textNoShape">
+              <a:avLst/>
+            </a:prstTxWarp>
+            <a:spAutoFit/>
+          </a:bodyPr>
+          <a:lstStyle/>
+          <a:p>
+            <a:endParaRPr lang="en-US"/>
+          </a:p>
+        </p:txBody>
+      </p:sp>
+      <p:sp>
+        <p:nvSpPr>
+          <p:cNvPr id="5" name="Rectangle 5">
+            <a:extLst>
+              <a:ext uri="{FF2B5EF4-FFF2-40B4-BE49-F238E27FC236}">
+                <a16:creationId xmlns:a16="http://schemas.microsoft.com/office/drawing/2014/main" id="{4A0B7773-16A2-EF73-FE8C-006B168A86AA}"/>
+              </a:ext>
+            </a:extLst>
+          </p:cNvPr>
+          <p:cNvSpPr>
+            <a:spLocks noChangeArrowheads="1"/>
+          </p:cNvSpPr>
+          <p:nvPr/>
+        </p:nvSpPr>
+        <p:spPr bwMode="auto">
+          <a:xfrm>
+            <a:off x="838200" y="4624287"/>
+            <a:ext cx="12192000" cy="457200"/>
+          </a:xfrm>
+          <a:prstGeom prst="rect">
+            <a:avLst/>
+          </a:prstGeom>
+          <a:noFill/>
+          <a:ln>
+            <a:noFill/>
+          </a:ln>
+          <a:effectLst/>
+          <a:extLst>
+            <a:ext uri="{909E8E84-426E-40DD-AFC4-6F175D3DCCD1}">
+              <a14:hiddenFill xmlns:a14="http://schemas.microsoft.com/office/drawing/2010/main">
+                <a:solidFill>
+                  <a:schemeClr val="accent1"/>
+                </a:solidFill>
+              </a14:hiddenFill>
+            </a:ext>
+            <a:ext uri="{91240B29-F687-4F45-9708-019B960494DF}">
+              <a14:hiddenLine xmlns:a14="http://schemas.microsoft.com/office/drawing/2010/main" w="9525">
+                <a:solidFill>
+                  <a:schemeClr val="tx1"/>
+                </a:solidFill>
+                <a:miter lim="800000"/>
+                <a:headEnd/>
+                <a:tailEnd/>
+              </a14:hiddenLine>
+            </a:ext>
+            <a:ext uri="{AF507438-7753-43E0-B8FC-AC1667EBCBE1}">
+              <a14:hiddenEffects xmlns:a14="http://schemas.microsoft.com/office/drawing/2010/main">
+                <a:effectLst>
+                  <a:outerShdw dist="35921" dir="2700000" algn="ctr" rotWithShape="0">
+                    <a:schemeClr val="bg2"/>
+                  </a:outerShdw>
+                </a:effectLst>
+              </a14:hiddenEffects>
+            </a:ext>
+          </a:extLst>
+        </p:spPr>
+        <p:txBody>
+          <a:bodyPr vert="horz" wrap="none" lIns="91440" tIns="45720" rIns="91440" bIns="45720" numCol="1" anchor="ctr" anchorCtr="0" compatLnSpc="1">
+            <a:prstTxWarp prst="textNoShape">
+              <a:avLst/>
+            </a:prstTxWarp>
+            <a:spAutoFit/>
+          </a:bodyPr>
+          <a:lstStyle/>
+          <a:p>
+            <a:endParaRPr lang="en-US"/>
+          </a:p>
+        </p:txBody>
+      </p:sp>
+      <p:sp>
+        <p:nvSpPr>
+          <p:cNvPr id="6" name="Rectangle 6">
+            <a:extLst>
+              <a:ext uri="{FF2B5EF4-FFF2-40B4-BE49-F238E27FC236}">
+                <a16:creationId xmlns:a16="http://schemas.microsoft.com/office/drawing/2014/main" id="{224F1692-6D6E-F63D-A718-25F5B5F1FAF6}"/>
+              </a:ext>
+            </a:extLst>
+          </p:cNvPr>
+          <p:cNvSpPr>
+            <a:spLocks noChangeArrowheads="1"/>
+          </p:cNvSpPr>
+          <p:nvPr/>
+        </p:nvSpPr>
+        <p:spPr bwMode="auto">
+          <a:xfrm>
+            <a:off x="838200" y="5691087"/>
+            <a:ext cx="12192000" cy="457200"/>
+          </a:xfrm>
+          <a:prstGeom prst="rect">
+            <a:avLst/>
+          </a:prstGeom>
+          <a:noFill/>
+          <a:ln>
+            <a:noFill/>
+          </a:ln>
+          <a:effectLst/>
+          <a:extLst>
+            <a:ext uri="{909E8E84-426E-40DD-AFC4-6F175D3DCCD1}">
+              <a14:hiddenFill xmlns:a14="http://schemas.microsoft.com/office/drawing/2010/main">
+                <a:solidFill>
+                  <a:schemeClr val="accent1"/>
+                </a:solidFill>
+              </a14:hiddenFill>
+            </a:ext>
+            <a:ext uri="{91240B29-F687-4F45-9708-019B960494DF}">
+              <a14:hiddenLine xmlns:a14="http://schemas.microsoft.com/office/drawing/2010/main" w="9525">
+                <a:solidFill>
+                  <a:schemeClr val="tx1"/>
+                </a:solidFill>
+                <a:miter lim="800000"/>
+                <a:headEnd/>
+                <a:tailEnd/>
+              </a14:hiddenLine>
+            </a:ext>
+            <a:ext uri="{AF507438-7753-43E0-B8FC-AC1667EBCBE1}">
+              <a14:hiddenEffects xmlns:a14="http://schemas.microsoft.com/office/drawing/2010/main">
+                <a:effectLst>
+                  <a:outerShdw dist="35921" dir="2700000" algn="ctr" rotWithShape="0">
+                    <a:schemeClr val="bg2"/>
+                  </a:outerShdw>
+                </a:effectLst>
+              </a14:hiddenEffects>
+            </a:ext>
+          </a:extLst>
+        </p:spPr>
+        <p:txBody>
+          <a:bodyPr vert="horz" wrap="none" lIns="91440" tIns="45720" rIns="91440" bIns="45720" numCol="1" anchor="ctr" anchorCtr="0" compatLnSpc="1">
+            <a:prstTxWarp prst="textNoShape">
+              <a:avLst/>
+            </a:prstTxWarp>
+            <a:spAutoFit/>
+          </a:bodyPr>
+          <a:lstStyle/>
+          <a:p>
+            <a:endParaRPr lang="en-US"/>
+          </a:p>
+        </p:txBody>
+      </p:sp>
+      <p:pic>
+        <p:nvPicPr>
+          <p:cNvPr id="7" name="Picture 6">
+            <a:extLst>
+              <a:ext uri="{FF2B5EF4-FFF2-40B4-BE49-F238E27FC236}">
+                <a16:creationId xmlns:a16="http://schemas.microsoft.com/office/drawing/2014/main" id="{979E86FB-9D95-6D1B-6410-9822FDA9C9D9}"/>
+              </a:ext>
+            </a:extLst>
+          </p:cNvPr>
+          <p:cNvPicPr>
+            <a:picLocks noChangeAspect="1"/>
+          </p:cNvPicPr>
+          <p:nvPr/>
+        </p:nvPicPr>
+        <p:blipFill>
+          <a:blip r:embed="rId3"/>
+          <a:stretch>
+            <a:fillRect/>
+          </a:stretch>
+        </p:blipFill>
+        <p:spPr>
+          <a:xfrm>
+            <a:off x="399086" y="4359338"/>
+            <a:ext cx="9306884" cy="460281"/>
+          </a:xfrm>
+          <a:prstGeom prst="rect">
+            <a:avLst/>
+          </a:prstGeom>
+        </p:spPr>
+      </p:pic>
+      <p:pic>
+        <p:nvPicPr>
+          <p:cNvPr id="8" name="Picture 7">
+            <a:extLst>
+              <a:ext uri="{FF2B5EF4-FFF2-40B4-BE49-F238E27FC236}">
+                <a16:creationId xmlns:a16="http://schemas.microsoft.com/office/drawing/2014/main" id="{8309A982-B068-14B7-E27D-D8EB598F2185}"/>
+              </a:ext>
+            </a:extLst>
+          </p:cNvPr>
+          <p:cNvPicPr>
+            <a:picLocks noChangeAspect="1"/>
+          </p:cNvPicPr>
+          <p:nvPr/>
+        </p:nvPicPr>
+        <p:blipFill>
+          <a:blip r:embed="rId4"/>
+          <a:srcRect l="61583" t="3439" b="48806"/>
+          <a:stretch/>
+        </p:blipFill>
+        <p:spPr>
+          <a:xfrm>
+            <a:off x="741710" y="4944036"/>
+            <a:ext cx="4018375" cy="304800"/>
+          </a:xfrm>
+          <a:prstGeom prst="rect">
+            <a:avLst/>
+          </a:prstGeom>
+        </p:spPr>
+      </p:pic>
+      <p:pic>
+        <p:nvPicPr>
+          <p:cNvPr id="9" name="Picture 8">
+            <a:extLst>
+              <a:ext uri="{FF2B5EF4-FFF2-40B4-BE49-F238E27FC236}">
+                <a16:creationId xmlns:a16="http://schemas.microsoft.com/office/drawing/2014/main" id="{87109917-0382-7667-577F-5A5622ADC8C2}"/>
+              </a:ext>
+            </a:extLst>
+          </p:cNvPr>
+          <p:cNvPicPr>
+            <a:picLocks noChangeAspect="1"/>
+          </p:cNvPicPr>
+          <p:nvPr/>
+        </p:nvPicPr>
+        <p:blipFill>
+          <a:blip r:embed="rId4"/>
+          <a:srcRect t="52245"/>
+          <a:stretch/>
+        </p:blipFill>
+        <p:spPr>
+          <a:xfrm>
+            <a:off x="741710" y="5387675"/>
+            <a:ext cx="10459910" cy="304800"/>
+          </a:xfrm>
+          <a:prstGeom prst="rect">
+            <a:avLst/>
+          </a:prstGeom>
+        </p:spPr>
+      </p:pic>
+      <p:pic>
+        <p:nvPicPr>
+          <p:cNvPr id="11" name="Picture 10" descr="A close-up of a text&#10;&#10;Description automatically generated">
+            <a:extLst>
+              <a:ext uri="{FF2B5EF4-FFF2-40B4-BE49-F238E27FC236}">
+                <a16:creationId xmlns:a16="http://schemas.microsoft.com/office/drawing/2014/main" id="{DCE608B6-6222-C372-066C-F5A276C416B8}"/>
+              </a:ext>
+            </a:extLst>
+          </p:cNvPr>
+          <p:cNvPicPr>
+            <a:picLocks noChangeAspect="1"/>
+          </p:cNvPicPr>
+          <p:nvPr/>
+        </p:nvPicPr>
+        <p:blipFill>
+          <a:blip r:embed="rId5"/>
+          <a:srcRect t="70838"/>
+          <a:stretch/>
+        </p:blipFill>
+        <p:spPr>
+          <a:xfrm>
+            <a:off x="399089" y="5659910"/>
+            <a:ext cx="10404797" cy="823075"/>
+          </a:xfrm>
+          <a:prstGeom prst="rect">
+            <a:avLst/>
+          </a:prstGeom>
+        </p:spPr>
+      </p:pic>
+      <p:cxnSp>
+        <p:nvCxnSpPr>
+          <p:cNvPr id="12" name="Straight Connector 11">
+            <a:extLst>
+              <a:ext uri="{FF2B5EF4-FFF2-40B4-BE49-F238E27FC236}">
+                <a16:creationId xmlns:a16="http://schemas.microsoft.com/office/drawing/2014/main" id="{BA520CE4-DD4E-19DD-872D-45A347B835DE}"/>
+              </a:ext>
+            </a:extLst>
+          </p:cNvPr>
+          <p:cNvCxnSpPr>
+            <a:cxnSpLocks/>
+          </p:cNvCxnSpPr>
+          <p:nvPr/>
+        </p:nvCxnSpPr>
+        <p:spPr>
+          <a:xfrm>
+            <a:off x="9240041" y="5799102"/>
+            <a:ext cx="0" cy="271464"/>
+          </a:xfrm>
+          <a:prstGeom prst="line">
+            <a:avLst/>
+          </a:prstGeom>
+          <a:ln w="12700">
+            <a:solidFill>
+              <a:schemeClr val="tx1"/>
+            </a:solidFill>
+          </a:ln>
+        </p:spPr>
+        <p:style>
+          <a:lnRef idx="2">
+            <a:schemeClr val="accent1"/>
+          </a:lnRef>
+          <a:fillRef idx="0">
+            <a:schemeClr val="accent1"/>
+          </a:fillRef>
+          <a:effectRef idx="1">
+            <a:schemeClr val="accent1"/>
+          </a:effectRef>
+          <a:fontRef idx="minor">
+            <a:schemeClr val="tx1"/>
+          </a:fontRef>
+        </p:style>
+      </p:cxnSp>
       <p:graphicFrame>
         <p:nvGraphicFramePr>
           <p:cNvPr id="15" name="Table 14">
             <a:extLst>
               <a:ext uri="{FF2B5EF4-FFF2-40B4-BE49-F238E27FC236}">
-                <a16:creationId xmlns:a16="http://schemas.microsoft.com/office/drawing/2014/main" id="{DC8F6C51-A6E1-4E20-4A66-400BFCB19C81}"/>
+                <a16:creationId xmlns:a16="http://schemas.microsoft.com/office/drawing/2014/main" id="{31FA09FE-811E-865F-EE3D-AD763F986752}"/>
               </a:ext>
             </a:extLst>
           </p:cNvPr>
           <p:cNvGraphicFramePr>
             <a:graphicFrameLocks noGrp="1"/>
           </p:cNvGraphicFramePr>
-          <p:nvPr/>
+          <p:nvPr>
+            <p:extLst>
+              <p:ext uri="{D42A27DB-BD31-4B8C-83A1-F6EECF244321}">
+                <p14:modId xmlns:p14="http://schemas.microsoft.com/office/powerpoint/2010/main" val="2194705396"/>
+              </p:ext>
+            </p:extLst>
+          </p:nvPr>
         </p:nvGraphicFramePr>
         <p:xfrm>
-          <a:off x="827981" y="2267177"/>
+          <a:off x="797209" y="1947884"/>
           <a:ext cx="10515600" cy="1106265"/>
         </p:xfrm>
         <a:graphic>
@@ -8574,458 +9574,49 @@
           </a:graphicData>
         </a:graphic>
       </p:graphicFrame>
+      <p:pic>
+        <p:nvPicPr>
+          <p:cNvPr id="13" name="Picture 12" descr="A close-up of a text&#10;&#10;Description automatically generated">
+            <a:extLst>
+              <a:ext uri="{FF2B5EF4-FFF2-40B4-BE49-F238E27FC236}">
+                <a16:creationId xmlns:a16="http://schemas.microsoft.com/office/drawing/2014/main" id="{CBAF953E-03E2-68E2-5166-7CE359342A80}"/>
+              </a:ext>
+            </a:extLst>
+          </p:cNvPr>
+          <p:cNvPicPr>
+            <a:picLocks noChangeAspect="1"/>
+          </p:cNvPicPr>
+          <p:nvPr/>
+        </p:nvPicPr>
+        <p:blipFill>
+          <a:blip r:embed="rId5"/>
+          <a:srcRect t="1" b="65520"/>
+          <a:stretch/>
+        </p:blipFill>
+        <p:spPr>
+          <a:xfrm>
+            <a:off x="399085" y="3451658"/>
+            <a:ext cx="10560251" cy="987714"/>
+          </a:xfrm>
+          <a:prstGeom prst="rect">
+            <a:avLst/>
+          </a:prstGeom>
+        </p:spPr>
+      </p:pic>
     </p:spTree>
     <p:extLst>
       <p:ext uri="{BB962C8B-B14F-4D97-AF65-F5344CB8AC3E}">
-        <p14:creationId xmlns:p14="http://schemas.microsoft.com/office/powerpoint/2010/main" val="2326768796"/>
+        <p14:creationId xmlns:p14="http://schemas.microsoft.com/office/powerpoint/2010/main" val="231334887"/>
       </p:ext>
     </p:extLst>
   </p:cSld>
   <p:clrMapOvr>
     <a:masterClrMapping/>
   </p:clrMapOvr>
-  <p:timing>
-    <p:tnLst>
-      <p:par>
-        <p:cTn id="1" dur="indefinite" restart="never" nodeType="tmRoot">
-          <p:childTnLst>
-            <p:seq concurrent="1" nextAc="seek">
-              <p:cTn id="2" dur="indefinite" nodeType="mainSeq">
-                <p:childTnLst>
-                  <p:par>
-                    <p:cTn id="3" fill="hold">
-                      <p:stCondLst>
-                        <p:cond delay="indefinite"/>
-                      </p:stCondLst>
-                      <p:childTnLst>
-                        <p:par>
-                          <p:cTn id="4" fill="hold">
-                            <p:stCondLst>
-                              <p:cond delay="0"/>
-                            </p:stCondLst>
-                            <p:childTnLst>
-                              <p:par>
-                                <p:cTn id="5" presetID="1" presetClass="entr" presetSubtype="0" fill="hold" nodeType="clickEffect">
-                                  <p:stCondLst>
-                                    <p:cond delay="0"/>
-                                  </p:stCondLst>
-                                  <p:childTnLst>
-                                    <p:set>
-                                      <p:cBhvr>
-                                        <p:cTn id="6" dur="1" fill="hold">
-                                          <p:stCondLst>
-                                            <p:cond delay="0"/>
-                                          </p:stCondLst>
-                                        </p:cTn>
-                                        <p:tgtEl>
-                                          <p:spTgt spid="3">
-                                            <p:txEl>
-                                              <p:pRg st="0" end="0"/>
-                                            </p:txEl>
-                                          </p:spTgt>
-                                        </p:tgtEl>
-                                        <p:attrNameLst>
-                                          <p:attrName>style.visibility</p:attrName>
-                                        </p:attrNameLst>
-                                      </p:cBhvr>
-                                      <p:to>
-                                        <p:strVal val="visible"/>
-                                      </p:to>
-                                    </p:set>
-                                  </p:childTnLst>
-                                </p:cTn>
-                              </p:par>
-                            </p:childTnLst>
-                          </p:cTn>
-                        </p:par>
-                      </p:childTnLst>
-                    </p:cTn>
-                  </p:par>
-                  <p:par>
-                    <p:cTn id="7" fill="hold">
-                      <p:stCondLst>
-                        <p:cond delay="indefinite"/>
-                      </p:stCondLst>
-                      <p:childTnLst>
-                        <p:par>
-                          <p:cTn id="8" fill="hold">
-                            <p:stCondLst>
-                              <p:cond delay="0"/>
-                            </p:stCondLst>
-                            <p:childTnLst>
-                              <p:par>
-                                <p:cTn id="9" presetID="1" presetClass="entr" presetSubtype="0" fill="hold" nodeType="clickEffect">
-                                  <p:stCondLst>
-                                    <p:cond delay="0"/>
-                                  </p:stCondLst>
-                                  <p:childTnLst>
-                                    <p:set>
-                                      <p:cBhvr>
-                                        <p:cTn id="10" dur="1" fill="hold">
-                                          <p:stCondLst>
-                                            <p:cond delay="0"/>
-                                          </p:stCondLst>
-                                        </p:cTn>
-                                        <p:tgtEl>
-                                          <p:spTgt spid="3">
-                                            <p:txEl>
-                                              <p:pRg st="1" end="1"/>
-                                            </p:txEl>
-                                          </p:spTgt>
-                                        </p:tgtEl>
-                                        <p:attrNameLst>
-                                          <p:attrName>style.visibility</p:attrName>
-                                        </p:attrNameLst>
-                                      </p:cBhvr>
-                                      <p:to>
-                                        <p:strVal val="visible"/>
-                                      </p:to>
-                                    </p:set>
-                                  </p:childTnLst>
-                                </p:cTn>
-                              </p:par>
-                            </p:childTnLst>
-                          </p:cTn>
-                        </p:par>
-                      </p:childTnLst>
-                    </p:cTn>
-                  </p:par>
-                  <p:par>
-                    <p:cTn id="11" fill="hold">
-                      <p:stCondLst>
-                        <p:cond delay="indefinite"/>
-                      </p:stCondLst>
-                      <p:childTnLst>
-                        <p:par>
-                          <p:cTn id="12" fill="hold">
-                            <p:stCondLst>
-                              <p:cond delay="0"/>
-                            </p:stCondLst>
-                            <p:childTnLst>
-                              <p:par>
-                                <p:cTn id="13" presetID="1" presetClass="entr" presetSubtype="0" fill="hold" nodeType="clickEffect">
-                                  <p:stCondLst>
-                                    <p:cond delay="0"/>
-                                  </p:stCondLst>
-                                  <p:childTnLst>
-                                    <p:set>
-                                      <p:cBhvr>
-                                        <p:cTn id="14" dur="1" fill="hold">
-                                          <p:stCondLst>
-                                            <p:cond delay="0"/>
-                                          </p:stCondLst>
-                                        </p:cTn>
-                                        <p:tgtEl>
-                                          <p:spTgt spid="15"/>
-                                        </p:tgtEl>
-                                        <p:attrNameLst>
-                                          <p:attrName>style.visibility</p:attrName>
-                                        </p:attrNameLst>
-                                      </p:cBhvr>
-                                      <p:to>
-                                        <p:strVal val="visible"/>
-                                      </p:to>
-                                    </p:set>
-                                  </p:childTnLst>
-                                </p:cTn>
-                              </p:par>
-                            </p:childTnLst>
-                          </p:cTn>
-                        </p:par>
-                      </p:childTnLst>
-                    </p:cTn>
-                  </p:par>
-                  <p:par>
-                    <p:cTn id="15" fill="hold">
-                      <p:stCondLst>
-                        <p:cond delay="indefinite"/>
-                      </p:stCondLst>
-                      <p:childTnLst>
-                        <p:par>
-                          <p:cTn id="16" fill="hold">
-                            <p:stCondLst>
-                              <p:cond delay="0"/>
-                            </p:stCondLst>
-                            <p:childTnLst>
-                              <p:par>
-                                <p:cTn id="17" presetID="1" presetClass="entr" presetSubtype="0" fill="hold" nodeType="clickEffect">
-                                  <p:stCondLst>
-                                    <p:cond delay="0"/>
-                                  </p:stCondLst>
-                                  <p:childTnLst>
-                                    <p:set>
-                                      <p:cBhvr>
-                                        <p:cTn id="18" dur="1" fill="hold">
-                                          <p:stCondLst>
-                                            <p:cond delay="0"/>
-                                          </p:stCondLst>
-                                        </p:cTn>
-                                        <p:tgtEl>
-                                          <p:spTgt spid="3">
-                                            <p:txEl>
-                                              <p:pRg st="4" end="4"/>
-                                            </p:txEl>
-                                          </p:spTgt>
-                                        </p:tgtEl>
-                                        <p:attrNameLst>
-                                          <p:attrName>style.visibility</p:attrName>
-                                        </p:attrNameLst>
-                                      </p:cBhvr>
-                                      <p:to>
-                                        <p:strVal val="visible"/>
-                                      </p:to>
-                                    </p:set>
-                                  </p:childTnLst>
-                                </p:cTn>
-                              </p:par>
-                            </p:childTnLst>
-                          </p:cTn>
-                        </p:par>
-                      </p:childTnLst>
-                    </p:cTn>
-                  </p:par>
-                  <p:par>
-                    <p:cTn id="19" fill="hold">
-                      <p:stCondLst>
-                        <p:cond delay="indefinite"/>
-                      </p:stCondLst>
-                      <p:childTnLst>
-                        <p:par>
-                          <p:cTn id="20" fill="hold">
-                            <p:stCondLst>
-                              <p:cond delay="0"/>
-                            </p:stCondLst>
-                            <p:childTnLst>
-                              <p:par>
-                                <p:cTn id="21" presetID="1" presetClass="entr" presetSubtype="0" fill="hold" nodeType="clickEffect">
-                                  <p:stCondLst>
-                                    <p:cond delay="0"/>
-                                  </p:stCondLst>
-                                  <p:childTnLst>
-                                    <p:set>
-                                      <p:cBhvr>
-                                        <p:cTn id="22" dur="1" fill="hold">
-                                          <p:stCondLst>
-                                            <p:cond delay="0"/>
-                                          </p:stCondLst>
-                                        </p:cTn>
-                                        <p:tgtEl>
-                                          <p:spTgt spid="10"/>
-                                        </p:tgtEl>
-                                        <p:attrNameLst>
-                                          <p:attrName>style.visibility</p:attrName>
-                                        </p:attrNameLst>
-                                      </p:cBhvr>
-                                      <p:to>
-                                        <p:strVal val="visible"/>
-                                      </p:to>
-                                    </p:set>
-                                  </p:childTnLst>
-                                </p:cTn>
-                              </p:par>
-                            </p:childTnLst>
-                          </p:cTn>
-                        </p:par>
-                      </p:childTnLst>
-                    </p:cTn>
-                  </p:par>
-                  <p:par>
-                    <p:cTn id="23" fill="hold">
-                      <p:stCondLst>
-                        <p:cond delay="indefinite"/>
-                      </p:stCondLst>
-                      <p:childTnLst>
-                        <p:par>
-                          <p:cTn id="24" fill="hold">
-                            <p:stCondLst>
-                              <p:cond delay="0"/>
-                            </p:stCondLst>
-                            <p:childTnLst>
-                              <p:par>
-                                <p:cTn id="25" presetID="1" presetClass="entr" presetSubtype="0" fill="hold" nodeType="clickEffect">
-                                  <p:stCondLst>
-                                    <p:cond delay="0"/>
-                                  </p:stCondLst>
-                                  <p:childTnLst>
-                                    <p:set>
-                                      <p:cBhvr>
-                                        <p:cTn id="26" dur="1" fill="hold">
-                                          <p:stCondLst>
-                                            <p:cond delay="0"/>
-                                          </p:stCondLst>
-                                        </p:cTn>
-                                        <p:tgtEl>
-                                          <p:spTgt spid="8"/>
-                                        </p:tgtEl>
-                                        <p:attrNameLst>
-                                          <p:attrName>style.visibility</p:attrName>
-                                        </p:attrNameLst>
-                                      </p:cBhvr>
-                                      <p:to>
-                                        <p:strVal val="visible"/>
-                                      </p:to>
-                                    </p:set>
-                                  </p:childTnLst>
-                                </p:cTn>
-                              </p:par>
-                              <p:par>
-                                <p:cTn id="27" presetID="1" presetClass="entr" presetSubtype="0" fill="hold" nodeType="withEffect">
-                                  <p:stCondLst>
-                                    <p:cond delay="0"/>
-                                  </p:stCondLst>
-                                  <p:childTnLst>
-                                    <p:set>
-                                      <p:cBhvr>
-                                        <p:cTn id="28" dur="1" fill="hold">
-                                          <p:stCondLst>
-                                            <p:cond delay="0"/>
-                                          </p:stCondLst>
-                                        </p:cTn>
-                                        <p:tgtEl>
-                                          <p:spTgt spid="7"/>
-                                        </p:tgtEl>
-                                        <p:attrNameLst>
-                                          <p:attrName>style.visibility</p:attrName>
-                                        </p:attrNameLst>
-                                      </p:cBhvr>
-                                      <p:to>
-                                        <p:strVal val="visible"/>
-                                      </p:to>
-                                    </p:set>
-                                  </p:childTnLst>
-                                </p:cTn>
-                              </p:par>
-                              <p:par>
-                                <p:cTn id="29" presetID="1" presetClass="entr" presetSubtype="0" fill="hold" nodeType="withEffect">
-                                  <p:stCondLst>
-                                    <p:cond delay="0"/>
-                                  </p:stCondLst>
-                                  <p:childTnLst>
-                                    <p:set>
-                                      <p:cBhvr>
-                                        <p:cTn id="30" dur="1" fill="hold">
-                                          <p:stCondLst>
-                                            <p:cond delay="0"/>
-                                          </p:stCondLst>
-                                        </p:cTn>
-                                        <p:tgtEl>
-                                          <p:spTgt spid="9"/>
-                                        </p:tgtEl>
-                                        <p:attrNameLst>
-                                          <p:attrName>style.visibility</p:attrName>
-                                        </p:attrNameLst>
-                                      </p:cBhvr>
-                                      <p:to>
-                                        <p:strVal val="visible"/>
-                                      </p:to>
-                                    </p:set>
-                                  </p:childTnLst>
-                                </p:cTn>
-                              </p:par>
-                            </p:childTnLst>
-                          </p:cTn>
-                        </p:par>
-                      </p:childTnLst>
-                    </p:cTn>
-                  </p:par>
-                  <p:par>
-                    <p:cTn id="31" fill="hold">
-                      <p:stCondLst>
-                        <p:cond delay="indefinite"/>
-                      </p:stCondLst>
-                      <p:childTnLst>
-                        <p:par>
-                          <p:cTn id="32" fill="hold">
-                            <p:stCondLst>
-                              <p:cond delay="0"/>
-                            </p:stCondLst>
-                            <p:childTnLst>
-                              <p:par>
-                                <p:cTn id="33" presetID="1" presetClass="entr" presetSubtype="0" fill="hold" nodeType="clickEffect">
-                                  <p:stCondLst>
-                                    <p:cond delay="0"/>
-                                  </p:stCondLst>
-                                  <p:childTnLst>
-                                    <p:set>
-                                      <p:cBhvr>
-                                        <p:cTn id="34" dur="1" fill="hold">
-                                          <p:stCondLst>
-                                            <p:cond delay="0"/>
-                                          </p:stCondLst>
-                                        </p:cTn>
-                                        <p:tgtEl>
-                                          <p:spTgt spid="11"/>
-                                        </p:tgtEl>
-                                        <p:attrNameLst>
-                                          <p:attrName>style.visibility</p:attrName>
-                                        </p:attrNameLst>
-                                      </p:cBhvr>
-                                      <p:to>
-                                        <p:strVal val="visible"/>
-                                      </p:to>
-                                    </p:set>
-                                  </p:childTnLst>
-                                </p:cTn>
-                              </p:par>
-                              <p:par>
-                                <p:cTn id="35" presetID="1" presetClass="entr" presetSubtype="0" fill="hold" nodeType="withEffect">
-                                  <p:stCondLst>
-                                    <p:cond delay="0"/>
-                                  </p:stCondLst>
-                                  <p:childTnLst>
-                                    <p:set>
-                                      <p:cBhvr>
-                                        <p:cTn id="36" dur="1" fill="hold">
-                                          <p:stCondLst>
-                                            <p:cond delay="0"/>
-                                          </p:stCondLst>
-                                        </p:cTn>
-                                        <p:tgtEl>
-                                          <p:spTgt spid="12"/>
-                                        </p:tgtEl>
-                                        <p:attrNameLst>
-                                          <p:attrName>style.visibility</p:attrName>
-                                        </p:attrNameLst>
-                                      </p:cBhvr>
-                                      <p:to>
-                                        <p:strVal val="visible"/>
-                                      </p:to>
-                                    </p:set>
-                                  </p:childTnLst>
-                                </p:cTn>
-                              </p:par>
-                            </p:childTnLst>
-                          </p:cTn>
-                        </p:par>
-                      </p:childTnLst>
-                    </p:cTn>
-                  </p:par>
-                </p:childTnLst>
-              </p:cTn>
-              <p:prevCondLst>
-                <p:cond evt="onPrev" delay="0">
-                  <p:tgtEl>
-                    <p:sldTgt/>
-                  </p:tgtEl>
-                </p:cond>
-              </p:prevCondLst>
-              <p:nextCondLst>
-                <p:cond evt="onNext" delay="0">
-                  <p:tgtEl>
-                    <p:sldTgt/>
-                  </p:tgtEl>
-                </p:cond>
-              </p:nextCondLst>
-            </p:seq>
-          </p:childTnLst>
-        </p:cTn>
-      </p:par>
-    </p:tnLst>
-  </p:timing>
 </p:sld>
 </file>
 
-<file path=ppt/slides/slide5.xml><?xml version="1.0" encoding="utf-8"?>
+<file path=ppt/slides/slide6.xml><?xml version="1.0" encoding="utf-8"?>
 <p:sld xmlns:a="http://schemas.openxmlformats.org/drawingml/2006/main" xmlns:r="http://schemas.openxmlformats.org/officeDocument/2006/relationships" xmlns:p="http://schemas.openxmlformats.org/presentationml/2006/main">
   <p:cSld>
     <p:spTree>
@@ -9383,7 +9974,7 @@
 </p:sld>
 </file>
 
-<file path=ppt/slides/slide6.xml><?xml version="1.0" encoding="utf-8"?>
+<file path=ppt/slides/slide7.xml><?xml version="1.0" encoding="utf-8"?>
 <p:sld xmlns:a="http://schemas.openxmlformats.org/drawingml/2006/main" xmlns:r="http://schemas.openxmlformats.org/officeDocument/2006/relationships" xmlns:p="http://schemas.openxmlformats.org/presentationml/2006/main">
   <p:cSld>
     <p:spTree>
@@ -10080,7 +10671,7 @@
 </p:sld>
 </file>
 
-<file path=ppt/slides/slide7.xml><?xml version="1.0" encoding="utf-8"?>
+<file path=ppt/slides/slide8.xml><?xml version="1.0" encoding="utf-8"?>
 <p:sld xmlns:a="http://schemas.openxmlformats.org/drawingml/2006/main" xmlns:r="http://schemas.openxmlformats.org/officeDocument/2006/relationships" xmlns:p="http://schemas.openxmlformats.org/presentationml/2006/main">
   <p:cSld>
     <p:spTree>
@@ -10611,189 +11202,6 @@
     <p:extLst>
       <p:ext uri="{BB962C8B-B14F-4D97-AF65-F5344CB8AC3E}">
         <p14:creationId xmlns:p14="http://schemas.microsoft.com/office/powerpoint/2010/main" val="300980877"/>
-      </p:ext>
-    </p:extLst>
-  </p:cSld>
-  <p:clrMapOvr>
-    <a:masterClrMapping/>
-  </p:clrMapOvr>
-</p:sld>
-</file>
-
-<file path=ppt/slides/slide8.xml><?xml version="1.0" encoding="utf-8"?>
-<p:sld xmlns:a="http://schemas.openxmlformats.org/drawingml/2006/main" xmlns:r="http://schemas.openxmlformats.org/officeDocument/2006/relationships" xmlns:p="http://schemas.openxmlformats.org/presentationml/2006/main">
-  <p:cSld>
-    <p:spTree>
-      <p:nvGrpSpPr>
-        <p:cNvPr id="1" name=""/>
-        <p:cNvGrpSpPr/>
-        <p:nvPr/>
-      </p:nvGrpSpPr>
-      <p:grpSpPr>
-        <a:xfrm>
-          <a:off x="0" y="0"/>
-          <a:ext cx="0" cy="0"/>
-          <a:chOff x="0" y="0"/>
-          <a:chExt cx="0" cy="0"/>
-        </a:xfrm>
-      </p:grpSpPr>
-      <p:sp>
-        <p:nvSpPr>
-          <p:cNvPr id="2" name="Title 1">
-            <a:extLst>
-              <a:ext uri="{FF2B5EF4-FFF2-40B4-BE49-F238E27FC236}">
-                <a16:creationId xmlns:a16="http://schemas.microsoft.com/office/drawing/2014/main" id="{17D35D92-E003-1AE5-0BCE-8CB874221286}"/>
-              </a:ext>
-            </a:extLst>
-          </p:cNvPr>
-          <p:cNvSpPr>
-            <a:spLocks noGrp="1"/>
-          </p:cNvSpPr>
-          <p:nvPr>
-            <p:ph type="title"/>
-          </p:nvPr>
-        </p:nvSpPr>
-        <p:spPr/>
-        <p:txBody>
-          <a:bodyPr/>
-          <a:lstStyle/>
-          <a:p>
-            <a:r>
-              <a:rPr lang="en-US" dirty="0"/>
-              <a:t>IP </a:t>
-            </a:r>
-            <a:r>
-              <a:rPr lang="en-US" dirty="0" err="1"/>
-              <a:t>PuLP</a:t>
-            </a:r>
-            <a:r>
-              <a:rPr lang="en-US" dirty="0"/>
-              <a:t> Implementation</a:t>
-            </a:r>
-          </a:p>
-        </p:txBody>
-      </p:sp>
-      <p:sp>
-        <p:nvSpPr>
-          <p:cNvPr id="3" name="Content Placeholder 2">
-            <a:extLst>
-              <a:ext uri="{FF2B5EF4-FFF2-40B4-BE49-F238E27FC236}">
-                <a16:creationId xmlns:a16="http://schemas.microsoft.com/office/drawing/2014/main" id="{568D5765-FACC-3868-CA4E-3051B620171C}"/>
-              </a:ext>
-            </a:extLst>
-          </p:cNvPr>
-          <p:cNvSpPr>
-            <a:spLocks noGrp="1"/>
-          </p:cNvSpPr>
-          <p:nvPr>
-            <p:ph idx="1"/>
-          </p:nvPr>
-        </p:nvSpPr>
-        <p:spPr/>
-        <p:txBody>
-          <a:bodyPr/>
-          <a:lstStyle/>
-          <a:p>
-            <a:pPr marL="0" indent="0">
-              <a:buNone/>
-            </a:pPr>
-            <a:r>
-              <a:rPr lang="en-US" dirty="0"/>
-              <a:t>Solution:</a:t>
-            </a:r>
-          </a:p>
-          <a:p>
-            <a:pPr marL="0" indent="0">
-              <a:buNone/>
-            </a:pPr>
-            <a:r>
-              <a:rPr lang="en-US" sz="2000" dirty="0">
-                <a:latin typeface="Courier New" panose="02070309020205020404" pitchFamily="49" charset="0"/>
-                <a:cs typeface="Courier New" panose="02070309020205020404" pitchFamily="49" charset="0"/>
-              </a:rPr>
-              <a:t>Matches: </a:t>
-            </a:r>
-          </a:p>
-          <a:p>
-            <a:pPr marL="0" indent="0">
-              <a:buNone/>
-            </a:pPr>
-            <a:r>
-              <a:rPr lang="en-US" sz="2000" dirty="0">
-                <a:latin typeface="Courier New" panose="02070309020205020404" pitchFamily="49" charset="0"/>
-                <a:cs typeface="Courier New" panose="02070309020205020404" pitchFamily="49" charset="0"/>
-              </a:rPr>
-              <a:t>Alan Cindy	Bob Alice	Carl Debbie	Dan Brenda	</a:t>
-            </a:r>
-          </a:p>
-          <a:p>
-            <a:pPr marL="0" indent="0">
-              <a:buNone/>
-            </a:pPr>
-            <a:r>
-              <a:rPr lang="en-US" sz="2000" dirty="0">
-                <a:latin typeface="Courier New" panose="02070309020205020404" pitchFamily="49" charset="0"/>
-                <a:cs typeface="Courier New" panose="02070309020205020404" pitchFamily="49" charset="0"/>
-              </a:rPr>
-              <a:t>Status:  Optimal</a:t>
-            </a:r>
-          </a:p>
-          <a:p>
-            <a:pPr marL="0" indent="0">
-              <a:buNone/>
-            </a:pPr>
-            <a:r>
-              <a:rPr lang="en-US" sz="2000" dirty="0">
-                <a:latin typeface="Courier New" panose="02070309020205020404" pitchFamily="49" charset="0"/>
-                <a:cs typeface="Courier New" panose="02070309020205020404" pitchFamily="49" charset="0"/>
-              </a:rPr>
-              <a:t>Stable matching?  True</a:t>
-            </a:r>
-          </a:p>
-          <a:p>
-            <a:pPr marL="0" indent="0">
-              <a:buNone/>
-            </a:pPr>
-            <a:endParaRPr lang="en-US" sz="2000" dirty="0">
-              <a:latin typeface="Courier New" panose="02070309020205020404" pitchFamily="49" charset="0"/>
-              <a:cs typeface="Courier New" panose="02070309020205020404" pitchFamily="49" charset="0"/>
-            </a:endParaRPr>
-          </a:p>
-          <a:p>
-            <a:pPr marL="0" indent="0">
-              <a:buNone/>
-            </a:pPr>
-            <a:r>
-              <a:rPr lang="en-US" dirty="0"/>
-              <a:t>It ran the function </a:t>
-            </a:r>
-            <a:r>
-              <a:rPr lang="en-US" sz="2400" dirty="0" err="1">
-                <a:latin typeface="Courier New" panose="02070309020205020404" pitchFamily="49" charset="0"/>
-                <a:cs typeface="Courier New" panose="02070309020205020404" pitchFamily="49" charset="0"/>
-              </a:rPr>
-              <a:t>smp_utils.is_it_stable</a:t>
-            </a:r>
-            <a:r>
-              <a:rPr lang="en-US" dirty="0"/>
-              <a:t> – see that code.</a:t>
-            </a:r>
-          </a:p>
-          <a:p>
-            <a:pPr marL="0" indent="0">
-              <a:buNone/>
-            </a:pPr>
-            <a:endParaRPr lang="en-US" dirty="0">
-              <a:latin typeface="Courier New" panose="02070309020205020404" pitchFamily="49" charset="0"/>
-              <a:cs typeface="Courier New" panose="02070309020205020404" pitchFamily="49" charset="0"/>
-            </a:endParaRPr>
-          </a:p>
-        </p:txBody>
-      </p:sp>
-    </p:spTree>
-    <p:extLst>
-      <p:ext uri="{BB962C8B-B14F-4D97-AF65-F5344CB8AC3E}">
-        <p14:creationId xmlns:p14="http://schemas.microsoft.com/office/powerpoint/2010/main" val="2320473379"/>
       </p:ext>
     </p:extLst>
   </p:cSld>
@@ -10825,7 +11233,7 @@
           <p:cNvPr id="2" name="Title 1">
             <a:extLst>
               <a:ext uri="{FF2B5EF4-FFF2-40B4-BE49-F238E27FC236}">
-                <a16:creationId xmlns:a16="http://schemas.microsoft.com/office/drawing/2014/main" id="{F92EC9F5-BA9F-4F45-E562-22893BB2F2C1}"/>
+                <a16:creationId xmlns:a16="http://schemas.microsoft.com/office/drawing/2014/main" id="{17D35D92-E003-1AE5-0BCE-8CB874221286}"/>
               </a:ext>
             </a:extLst>
           </p:cNvPr>
@@ -10843,7 +11251,15 @@
           <a:p>
             <a:r>
               <a:rPr lang="en-US" dirty="0"/>
-              <a:t>Implement an Objective in the IP</a:t>
+              <a:t>IP </a:t>
+            </a:r>
+            <a:r>
+              <a:rPr lang="en-US" dirty="0" err="1"/>
+              <a:t>PuLP</a:t>
+            </a:r>
+            <a:r>
+              <a:rPr lang="en-US" dirty="0"/>
+              <a:t> Implementation</a:t>
             </a:r>
           </a:p>
         </p:txBody>
@@ -10853,7 +11269,7 @@
           <p:cNvPr id="3" name="Content Placeholder 2">
             <a:extLst>
               <a:ext uri="{FF2B5EF4-FFF2-40B4-BE49-F238E27FC236}">
-                <a16:creationId xmlns:a16="http://schemas.microsoft.com/office/drawing/2014/main" id="{A50FECED-4337-0FA0-4956-6D6E17A2798F}"/>
+                <a16:creationId xmlns:a16="http://schemas.microsoft.com/office/drawing/2014/main" id="{568D5765-FACC-3868-CA4E-3051B620171C}"/>
               </a:ext>
             </a:extLst>
           </p:cNvPr>
@@ -10864,16 +11280,9 @@
             <p:ph idx="1"/>
           </p:nvPr>
         </p:nvSpPr>
-        <p:spPr>
-          <a:xfrm>
-            <a:off x="536642" y="5671224"/>
-            <a:ext cx="10515600" cy="898627"/>
-          </a:xfrm>
-        </p:spPr>
+        <p:spPr/>
         <p:txBody>
-          <a:bodyPr>
-            <a:normAutofit fontScale="92500" lnSpcReduction="10000"/>
-          </a:bodyPr>
+          <a:bodyPr/>
           <a:lstStyle/>
           <a:p>
             <a:pPr marL="0" indent="0">
@@ -10881,56 +11290,90 @@
             </a:pPr>
             <a:r>
               <a:rPr lang="en-US" dirty="0"/>
-              <a:t>Now we will need a data structure for </a:t>
-            </a:r>
-            <a:r>
-              <a:rPr lang="en-US" sz="2400" dirty="0">
-                <a:latin typeface="Courier New" panose="02070309020205020404" pitchFamily="49" charset="0"/>
-                <a:cs typeface="Courier New" panose="02070309020205020404" pitchFamily="49" charset="0"/>
-              </a:rPr>
-              <a:t>P</a:t>
-            </a:r>
-            <a:r>
-              <a:rPr lang="en-US" sz="2400" baseline="-25000" dirty="0">
-                <a:latin typeface="Courier New" panose="02070309020205020404" pitchFamily="49" charset="0"/>
-                <a:cs typeface="Courier New" panose="02070309020205020404" pitchFamily="49" charset="0"/>
-              </a:rPr>
-              <a:t>i</a:t>
-            </a:r>
-            <a:r>
-              <a:rPr lang="en-US" sz="2400" dirty="0">
-                <a:latin typeface="Courier New" panose="02070309020205020404" pitchFamily="49" charset="0"/>
-                <a:cs typeface="Courier New" panose="02070309020205020404" pitchFamily="49" charset="0"/>
-              </a:rPr>
-              <a:t>(j)</a:t>
-            </a:r>
+              <a:t>Solution:</a:t>
+            </a:r>
+          </a:p>
+          <a:p>
+            <a:pPr marL="0" indent="0">
+              <a:buNone/>
+            </a:pPr>
+            <a:r>
+              <a:rPr lang="en-US" sz="2000" dirty="0">
+                <a:latin typeface="Courier New" panose="02070309020205020404" pitchFamily="49" charset="0"/>
+                <a:cs typeface="Courier New" panose="02070309020205020404" pitchFamily="49" charset="0"/>
+              </a:rPr>
+              <a:t>Matches: </a:t>
+            </a:r>
+          </a:p>
+          <a:p>
+            <a:pPr marL="0" indent="0">
+              <a:buNone/>
+            </a:pPr>
+            <a:r>
+              <a:rPr lang="en-US" sz="2000" dirty="0">
+                <a:latin typeface="Courier New" panose="02070309020205020404" pitchFamily="49" charset="0"/>
+                <a:cs typeface="Courier New" panose="02070309020205020404" pitchFamily="49" charset="0"/>
+              </a:rPr>
+              <a:t>Alan Cindy	Bob Alice	Carl Debbie	Dan Brenda	</a:t>
+            </a:r>
+          </a:p>
+          <a:p>
+            <a:pPr marL="0" indent="0">
+              <a:buNone/>
+            </a:pPr>
+            <a:r>
+              <a:rPr lang="en-US" sz="2000" dirty="0">
+                <a:latin typeface="Courier New" panose="02070309020205020404" pitchFamily="49" charset="0"/>
+                <a:cs typeface="Courier New" panose="02070309020205020404" pitchFamily="49" charset="0"/>
+              </a:rPr>
+              <a:t>Status:  Optimal</a:t>
+            </a:r>
+          </a:p>
+          <a:p>
+            <a:pPr marL="0" indent="0">
+              <a:buNone/>
+            </a:pPr>
+            <a:r>
+              <a:rPr lang="en-US" sz="2000" dirty="0">
+                <a:latin typeface="Courier New" panose="02070309020205020404" pitchFamily="49" charset="0"/>
+                <a:cs typeface="Courier New" panose="02070309020205020404" pitchFamily="49" charset="0"/>
+              </a:rPr>
+              <a:t>Stable matching?  True</a:t>
+            </a:r>
+          </a:p>
+          <a:p>
+            <a:pPr marL="0" indent="0">
+              <a:buNone/>
+            </a:pPr>
+            <a:endParaRPr lang="en-US" sz="2000" dirty="0">
+              <a:latin typeface="Courier New" panose="02070309020205020404" pitchFamily="49" charset="0"/>
+              <a:cs typeface="Courier New" panose="02070309020205020404" pitchFamily="49" charset="0"/>
+            </a:endParaRPr>
+          </a:p>
+          <a:p>
+            <a:pPr marL="0" indent="0">
+              <a:buNone/>
+            </a:pPr>
             <a:r>
               <a:rPr lang="en-US" dirty="0"/>
-              <a:t>.</a:t>
+              <a:t>It ran the function </a:t>
+            </a:r>
+            <a:r>
+              <a:rPr lang="en-US" sz="2400" dirty="0" err="1">
+                <a:latin typeface="Courier New" panose="02070309020205020404" pitchFamily="49" charset="0"/>
+                <a:cs typeface="Courier New" panose="02070309020205020404" pitchFamily="49" charset="0"/>
+              </a:rPr>
+              <a:t>smp_utils.is_it_stable</a:t>
+            </a:r>
+            <a:r>
+              <a:rPr lang="en-US" dirty="0"/>
+              <a:t> – see that code.</a:t>
             </a:r>
           </a:p>
           <a:p>
             <a:pPr marL="0" indent="0">
               <a:buNone/>
             </a:pPr>
-            <a:r>
-              <a:rPr lang="en-US" dirty="0"/>
-              <a:t>We can use </a:t>
-            </a:r>
-            <a:r>
-              <a:rPr lang="en-US" sz="2600" dirty="0" err="1">
-                <a:latin typeface="Courier New" panose="02070309020205020404" pitchFamily="49" charset="0"/>
-                <a:cs typeface="Courier New" panose="02070309020205020404" pitchFamily="49" charset="0"/>
-              </a:rPr>
-              <a:t>smp_utils.prefs_to_ranks</a:t>
-            </a:r>
-            <a:r>
-              <a:rPr lang="en-US" sz="2600" dirty="0">
-                <a:latin typeface="Courier New" panose="02070309020205020404" pitchFamily="49" charset="0"/>
-                <a:cs typeface="Courier New" panose="02070309020205020404" pitchFamily="49" charset="0"/>
-              </a:rPr>
-              <a:t>.</a:t>
-            </a:r>
             <a:endParaRPr lang="en-US" dirty="0">
               <a:latin typeface="Courier New" panose="02070309020205020404" pitchFamily="49" charset="0"/>
               <a:cs typeface="Courier New" panose="02070309020205020404" pitchFamily="49" charset="0"/>
@@ -10938,40 +11381,10 @@
           </a:p>
         </p:txBody>
       </p:sp>
-      <p:pic>
-        <p:nvPicPr>
-          <p:cNvPr id="5" name="Picture 4">
-            <a:extLst>
-              <a:ext uri="{FF2B5EF4-FFF2-40B4-BE49-F238E27FC236}">
-                <a16:creationId xmlns:a16="http://schemas.microsoft.com/office/drawing/2014/main" id="{626A721A-DDD3-F143-35B5-E7FFABE3F893}"/>
-              </a:ext>
-            </a:extLst>
-          </p:cNvPr>
-          <p:cNvPicPr>
-            <a:picLocks noChangeAspect="1"/>
-          </p:cNvPicPr>
-          <p:nvPr/>
-        </p:nvPicPr>
-        <p:blipFill>
-          <a:blip r:embed="rId2"/>
-          <a:stretch>
-            <a:fillRect/>
-          </a:stretch>
-        </p:blipFill>
-        <p:spPr>
-          <a:xfrm>
-            <a:off x="0" y="1513732"/>
-            <a:ext cx="12192000" cy="4064000"/>
-          </a:xfrm>
-          <a:prstGeom prst="rect">
-            <a:avLst/>
-          </a:prstGeom>
-        </p:spPr>
-      </p:pic>
     </p:spTree>
     <p:extLst>
       <p:ext uri="{BB962C8B-B14F-4D97-AF65-F5344CB8AC3E}">
-        <p14:creationId xmlns:p14="http://schemas.microsoft.com/office/powerpoint/2010/main" val="3836707026"/>
+        <p14:creationId xmlns:p14="http://schemas.microsoft.com/office/powerpoint/2010/main" val="2320473379"/>
       </p:ext>
     </p:extLst>
   </p:cSld>

</xml_diff>